<commit_message>
Modify the x and y line of the image and change the name of the image
</commit_message>
<xml_diff>
--- a/01/img/origin/image_of_the_function_to_draw_shapes.pptx
+++ b/01/img/origin/image_of_the_function_to_draw_shapes.pptx
@@ -117,11 +117,7 @@
 <file path=ppt/commentAuthors.xml><?xml version="1.0" encoding="utf-8"?>
 <p:cmAuthorLst xmlns:a="http://schemas.openxmlformats.org/drawingml/2006/main" xmlns:r="http://schemas.openxmlformats.org/officeDocument/2006/relationships" xmlns:p="http://schemas.openxmlformats.org/presentationml/2006/main">
   <p:cmAuthor id="1" name="s a" initials="sa" lastIdx="2" clrIdx="0">
-    <p:extLst>
-      <p:ext uri="{19B8F6BF-5375-455C-9EA6-DF929625EA0E}">
-        <p15:presenceInfo xmlns:p15="http://schemas.microsoft.com/office/powerpoint/2012/main" userId="b2a807622ab71c12" providerId="Windows Live"/>
-      </p:ext>
-    </p:extLst>
+    <p:extLst/>
   </p:cmAuthor>
 </p:cmAuthorLst>
 </file>
@@ -257,7 +253,7 @@
           <a:p>
             <a:fld id="{99457851-FC96-4ECE-805F-5E2052AA7784}" type="datetimeFigureOut">
               <a:rPr kumimoji="1" lang="ja-JP" altLang="en-US" smtClean="0"/>
-              <a:t>2016/4/4</a:t>
+              <a:t>2016/4/5</a:t>
             </a:fld>
             <a:endParaRPr kumimoji="1" lang="ja-JP" altLang="en-US"/>
           </a:p>
@@ -459,7 +455,7 @@
           <a:p>
             <a:fld id="{99457851-FC96-4ECE-805F-5E2052AA7784}" type="datetimeFigureOut">
               <a:rPr kumimoji="1" lang="ja-JP" altLang="en-US" smtClean="0"/>
-              <a:t>2016/4/4</a:t>
+              <a:t>2016/4/5</a:t>
             </a:fld>
             <a:endParaRPr kumimoji="1" lang="ja-JP" altLang="en-US"/>
           </a:p>
@@ -671,7 +667,7 @@
           <a:p>
             <a:fld id="{99457851-FC96-4ECE-805F-5E2052AA7784}" type="datetimeFigureOut">
               <a:rPr kumimoji="1" lang="ja-JP" altLang="en-US" smtClean="0"/>
-              <a:t>2016/4/4</a:t>
+              <a:t>2016/4/5</a:t>
             </a:fld>
             <a:endParaRPr kumimoji="1" lang="ja-JP" altLang="en-US"/>
           </a:p>
@@ -873,7 +869,7 @@
           <a:p>
             <a:fld id="{99457851-FC96-4ECE-805F-5E2052AA7784}" type="datetimeFigureOut">
               <a:rPr kumimoji="1" lang="ja-JP" altLang="en-US" smtClean="0"/>
-              <a:t>2016/4/4</a:t>
+              <a:t>2016/4/5</a:t>
             </a:fld>
             <a:endParaRPr kumimoji="1" lang="ja-JP" altLang="en-US"/>
           </a:p>
@@ -1119,7 +1115,7 @@
           <a:p>
             <a:fld id="{99457851-FC96-4ECE-805F-5E2052AA7784}" type="datetimeFigureOut">
               <a:rPr kumimoji="1" lang="ja-JP" altLang="en-US" smtClean="0"/>
-              <a:t>2016/4/4</a:t>
+              <a:t>2016/4/5</a:t>
             </a:fld>
             <a:endParaRPr kumimoji="1" lang="ja-JP" altLang="en-US"/>
           </a:p>
@@ -1415,7 +1411,7 @@
           <a:p>
             <a:fld id="{99457851-FC96-4ECE-805F-5E2052AA7784}" type="datetimeFigureOut">
               <a:rPr kumimoji="1" lang="ja-JP" altLang="en-US" smtClean="0"/>
-              <a:t>2016/4/4</a:t>
+              <a:t>2016/4/5</a:t>
             </a:fld>
             <a:endParaRPr kumimoji="1" lang="ja-JP" altLang="en-US"/>
           </a:p>
@@ -1846,7 +1842,7 @@
           <a:p>
             <a:fld id="{99457851-FC96-4ECE-805F-5E2052AA7784}" type="datetimeFigureOut">
               <a:rPr kumimoji="1" lang="ja-JP" altLang="en-US" smtClean="0"/>
-              <a:t>2016/4/4</a:t>
+              <a:t>2016/4/5</a:t>
             </a:fld>
             <a:endParaRPr kumimoji="1" lang="ja-JP" altLang="en-US"/>
           </a:p>
@@ -1964,7 +1960,7 @@
           <a:p>
             <a:fld id="{99457851-FC96-4ECE-805F-5E2052AA7784}" type="datetimeFigureOut">
               <a:rPr kumimoji="1" lang="ja-JP" altLang="en-US" smtClean="0"/>
-              <a:t>2016/4/4</a:t>
+              <a:t>2016/4/5</a:t>
             </a:fld>
             <a:endParaRPr kumimoji="1" lang="ja-JP" altLang="en-US"/>
           </a:p>
@@ -2059,7 +2055,7 @@
           <a:p>
             <a:fld id="{99457851-FC96-4ECE-805F-5E2052AA7784}" type="datetimeFigureOut">
               <a:rPr kumimoji="1" lang="ja-JP" altLang="en-US" smtClean="0"/>
-              <a:t>2016/4/4</a:t>
+              <a:t>2016/4/5</a:t>
             </a:fld>
             <a:endParaRPr kumimoji="1" lang="ja-JP" altLang="en-US"/>
           </a:p>
@@ -2368,7 +2364,7 @@
           <a:p>
             <a:fld id="{99457851-FC96-4ECE-805F-5E2052AA7784}" type="datetimeFigureOut">
               <a:rPr kumimoji="1" lang="ja-JP" altLang="en-US" smtClean="0"/>
-              <a:t>2016/4/4</a:t>
+              <a:t>2016/4/5</a:t>
             </a:fld>
             <a:endParaRPr kumimoji="1" lang="ja-JP" altLang="en-US"/>
           </a:p>
@@ -2621,7 +2617,7 @@
           <a:p>
             <a:fld id="{99457851-FC96-4ECE-805F-5E2052AA7784}" type="datetimeFigureOut">
               <a:rPr kumimoji="1" lang="ja-JP" altLang="en-US" smtClean="0"/>
-              <a:t>2016/4/4</a:t>
+              <a:t>2016/4/5</a:t>
             </a:fld>
             <a:endParaRPr kumimoji="1" lang="ja-JP" altLang="en-US"/>
           </a:p>
@@ -2866,7 +2862,7 @@
           <a:p>
             <a:fld id="{99457851-FC96-4ECE-805F-5E2052AA7784}" type="datetimeFigureOut">
               <a:rPr kumimoji="1" lang="ja-JP" altLang="en-US" smtClean="0"/>
-              <a:t>2016/4/4</a:t>
+              <a:t>2016/4/5</a:t>
             </a:fld>
             <a:endParaRPr kumimoji="1" lang="ja-JP" altLang="en-US"/>
           </a:p>
@@ -3271,611 +3267,550 @@
           <a:chExt cx="0" cy="0"/>
         </a:xfrm>
       </p:grpSpPr>
-      <p:pic>
-        <p:nvPicPr>
-          <p:cNvPr id="5" name="図 4"/>
-          <p:cNvPicPr>
-            <a:picLocks noChangeAspect="1"/>
-          </p:cNvPicPr>
+      <p:grpSp>
+        <p:nvGrpSpPr>
+          <p:cNvPr id="2" name="図形グループ 1"/>
+          <p:cNvGrpSpPr/>
           <p:nvPr/>
-        </p:nvPicPr>
-        <p:blipFill rotWithShape="1">
-          <a:blip r:embed="rId2">
-            <a:extLst>
-              <a:ext uri="{28A0092B-C50C-407E-A947-70E740481C1C}">
-                <a14:useLocalDpi xmlns:a14="http://schemas.microsoft.com/office/drawing/2010/main" val="0"/>
-              </a:ext>
-            </a:extLst>
-          </a:blip>
-          <a:srcRect l="5386" t="11129" r="5803" b="15852"/>
-          <a:stretch/>
-        </p:blipFill>
-        <p:spPr>
+        </p:nvGrpSpPr>
+        <p:grpSpPr>
           <a:xfrm>
             <a:off x="3799269" y="1468192"/>
-            <a:ext cx="4572000" cy="3683358"/>
+            <a:ext cx="4643046" cy="3683358"/>
+            <a:chOff x="3799269" y="1468192"/>
+            <a:chExt cx="4643046" cy="3683358"/>
           </a:xfrm>
-          <a:prstGeom prst="rect">
-            <a:avLst/>
-          </a:prstGeom>
-        </p:spPr>
-      </p:pic>
-      <p:cxnSp>
-        <p:nvCxnSpPr>
-          <p:cNvPr id="8" name="直線コネクタ 7"/>
-          <p:cNvCxnSpPr/>
-          <p:nvPr/>
-        </p:nvCxnSpPr>
-        <p:spPr>
-          <a:xfrm>
-            <a:off x="4481564" y="2463409"/>
-            <a:ext cx="0" cy="240491"/>
-          </a:xfrm>
-          <a:prstGeom prst="line">
-            <a:avLst/>
-          </a:prstGeom>
-          <a:ln w="19050">
-            <a:solidFill>
-              <a:schemeClr val="tx1">
-                <a:lumMod val="75000"/>
-                <a:lumOff val="25000"/>
-              </a:schemeClr>
-            </a:solidFill>
-          </a:ln>
-        </p:spPr>
-        <p:style>
-          <a:lnRef idx="1">
-            <a:schemeClr val="accent1"/>
-          </a:lnRef>
-          <a:fillRef idx="0">
-            <a:schemeClr val="accent1"/>
-          </a:fillRef>
-          <a:effectRef idx="0">
-            <a:schemeClr val="accent1"/>
-          </a:effectRef>
-          <a:fontRef idx="minor">
-            <a:schemeClr val="tx1"/>
-          </a:fontRef>
-        </p:style>
-      </p:cxnSp>
-      <p:cxnSp>
-        <p:nvCxnSpPr>
-          <p:cNvPr id="10" name="直線コネクタ 9"/>
-          <p:cNvCxnSpPr/>
-          <p:nvPr/>
-        </p:nvCxnSpPr>
-        <p:spPr>
-          <a:xfrm>
-            <a:off x="3846173" y="2463409"/>
-            <a:ext cx="0" cy="240491"/>
-          </a:xfrm>
-          <a:prstGeom prst="line">
-            <a:avLst/>
-          </a:prstGeom>
-          <a:ln w="19050">
-            <a:solidFill>
-              <a:schemeClr val="tx1">
-                <a:lumMod val="75000"/>
-                <a:lumOff val="25000"/>
-              </a:schemeClr>
-            </a:solidFill>
-          </a:ln>
-        </p:spPr>
-        <p:style>
-          <a:lnRef idx="1">
-            <a:schemeClr val="accent1"/>
-          </a:lnRef>
-          <a:fillRef idx="0">
-            <a:schemeClr val="accent1"/>
-          </a:fillRef>
-          <a:effectRef idx="0">
-            <a:schemeClr val="accent1"/>
-          </a:effectRef>
-          <a:fontRef idx="minor">
-            <a:schemeClr val="tx1"/>
-          </a:fontRef>
-        </p:style>
-      </p:cxnSp>
-      <p:cxnSp>
-        <p:nvCxnSpPr>
-          <p:cNvPr id="14" name="直線コネクタ 13"/>
-          <p:cNvCxnSpPr/>
-          <p:nvPr/>
-        </p:nvCxnSpPr>
-        <p:spPr>
-          <a:xfrm>
-            <a:off x="3846173" y="2583654"/>
-            <a:ext cx="635391" cy="0"/>
-          </a:xfrm>
-          <a:prstGeom prst="line">
-            <a:avLst/>
-          </a:prstGeom>
-          <a:ln w="19050">
-            <a:solidFill>
-              <a:schemeClr val="tx1">
-                <a:lumMod val="75000"/>
-                <a:lumOff val="25000"/>
-              </a:schemeClr>
-            </a:solidFill>
-          </a:ln>
-        </p:spPr>
-        <p:style>
-          <a:lnRef idx="1">
-            <a:schemeClr val="accent1"/>
-          </a:lnRef>
-          <a:fillRef idx="0">
-            <a:schemeClr val="accent1"/>
-          </a:fillRef>
-          <a:effectRef idx="0">
-            <a:schemeClr val="accent1"/>
-          </a:effectRef>
-          <a:fontRef idx="minor">
-            <a:schemeClr val="tx1"/>
-          </a:fontRef>
-        </p:style>
-      </p:cxnSp>
-      <p:sp>
-        <p:nvSpPr>
-          <p:cNvPr id="15" name="テキスト ボックス 14"/>
-          <p:cNvSpPr txBox="1"/>
-          <p:nvPr/>
-        </p:nvSpPr>
-        <p:spPr>
-          <a:xfrm>
-            <a:off x="3846173" y="2243798"/>
-            <a:ext cx="2982351" cy="369332"/>
-          </a:xfrm>
-          <a:prstGeom prst="rect">
-            <a:avLst/>
-          </a:prstGeom>
-          <a:noFill/>
-        </p:spPr>
-        <p:txBody>
-          <a:bodyPr wrap="square" rtlCol="0">
-            <a:spAutoFit/>
-          </a:bodyPr>
-          <a:lstStyle/>
-          <a:p>
-            <a:r>
-              <a:rPr kumimoji="1" lang="en-US" altLang="ja-JP" dirty="0" smtClean="0"/>
-              <a:t>(90)</a:t>
-            </a:r>
-            <a:endParaRPr kumimoji="1" lang="ja-JP" altLang="en-US" dirty="0"/>
-          </a:p>
-        </p:txBody>
-      </p:sp>
-      <p:cxnSp>
-        <p:nvCxnSpPr>
-          <p:cNvPr id="20" name="直線コネクタ 19"/>
-          <p:cNvCxnSpPr/>
-          <p:nvPr/>
-        </p:nvCxnSpPr>
-        <p:spPr>
-          <a:xfrm rot="5400000">
-            <a:off x="4485080" y="1624152"/>
-            <a:ext cx="0" cy="240491"/>
-          </a:xfrm>
-          <a:prstGeom prst="line">
-            <a:avLst/>
-          </a:prstGeom>
-          <a:ln w="19050">
-            <a:solidFill>
-              <a:schemeClr val="tx1">
-                <a:lumMod val="75000"/>
-                <a:lumOff val="25000"/>
-              </a:schemeClr>
-            </a:solidFill>
-          </a:ln>
-        </p:spPr>
-        <p:style>
-          <a:lnRef idx="1">
-            <a:schemeClr val="accent1"/>
-          </a:lnRef>
-          <a:fillRef idx="0">
-            <a:schemeClr val="accent1"/>
-          </a:fillRef>
-          <a:effectRef idx="0">
-            <a:schemeClr val="accent1"/>
-          </a:effectRef>
-          <a:fontRef idx="minor">
-            <a:schemeClr val="tx1"/>
-          </a:fontRef>
-        </p:style>
-      </p:cxnSp>
-      <p:cxnSp>
-        <p:nvCxnSpPr>
-          <p:cNvPr id="21" name="直線コネクタ 20"/>
-          <p:cNvCxnSpPr/>
-          <p:nvPr/>
-        </p:nvCxnSpPr>
-        <p:spPr>
-          <a:xfrm rot="5400000">
-            <a:off x="4485081" y="2463409"/>
-            <a:ext cx="0" cy="240491"/>
-          </a:xfrm>
-          <a:prstGeom prst="line">
-            <a:avLst/>
-          </a:prstGeom>
-          <a:ln w="19050">
-            <a:solidFill>
-              <a:schemeClr val="tx1">
-                <a:lumMod val="75000"/>
-                <a:lumOff val="25000"/>
-              </a:schemeClr>
-            </a:solidFill>
-          </a:ln>
-        </p:spPr>
-        <p:style>
-          <a:lnRef idx="1">
-            <a:schemeClr val="accent1"/>
-          </a:lnRef>
-          <a:fillRef idx="0">
-            <a:schemeClr val="accent1"/>
-          </a:fillRef>
-          <a:effectRef idx="0">
-            <a:schemeClr val="accent1"/>
-          </a:effectRef>
-          <a:fontRef idx="minor">
-            <a:schemeClr val="tx1"/>
-          </a:fontRef>
-        </p:style>
-      </p:cxnSp>
-      <p:cxnSp>
-        <p:nvCxnSpPr>
-          <p:cNvPr id="22" name="直線コネクタ 21"/>
-          <p:cNvCxnSpPr/>
-          <p:nvPr/>
-        </p:nvCxnSpPr>
-        <p:spPr>
-          <a:xfrm>
-            <a:off x="4485081" y="1744397"/>
-            <a:ext cx="0" cy="844058"/>
-          </a:xfrm>
-          <a:prstGeom prst="line">
-            <a:avLst/>
-          </a:prstGeom>
-          <a:ln w="19050">
-            <a:solidFill>
-              <a:schemeClr val="tx1">
-                <a:lumMod val="75000"/>
-                <a:lumOff val="25000"/>
-              </a:schemeClr>
-            </a:solidFill>
-          </a:ln>
-        </p:spPr>
-        <p:style>
-          <a:lnRef idx="1">
-            <a:schemeClr val="accent1"/>
-          </a:lnRef>
-          <a:fillRef idx="0">
-            <a:schemeClr val="accent1"/>
-          </a:fillRef>
-          <a:effectRef idx="0">
-            <a:schemeClr val="accent1"/>
-          </a:effectRef>
-          <a:fontRef idx="minor">
-            <a:schemeClr val="tx1"/>
-          </a:fontRef>
-        </p:style>
-      </p:cxnSp>
-      <p:sp>
-        <p:nvSpPr>
-          <p:cNvPr id="33" name="テキスト ボックス 32"/>
-          <p:cNvSpPr txBox="1"/>
-          <p:nvPr/>
-        </p:nvSpPr>
-        <p:spPr>
-          <a:xfrm>
-            <a:off x="4481563" y="1756793"/>
-            <a:ext cx="2982351" cy="369332"/>
-          </a:xfrm>
-          <a:prstGeom prst="rect">
-            <a:avLst/>
-          </a:prstGeom>
-          <a:noFill/>
-        </p:spPr>
-        <p:txBody>
-          <a:bodyPr wrap="square" rtlCol="0">
-            <a:spAutoFit/>
-          </a:bodyPr>
-          <a:lstStyle/>
-          <a:p>
-            <a:r>
-              <a:rPr kumimoji="1" lang="en-US" altLang="ja-JP" dirty="0" smtClean="0"/>
-              <a:t>(120)</a:t>
-            </a:r>
-            <a:endParaRPr kumimoji="1" lang="ja-JP" altLang="en-US" dirty="0"/>
-          </a:p>
-        </p:txBody>
-      </p:sp>
-      <p:cxnSp>
-        <p:nvCxnSpPr>
-          <p:cNvPr id="35" name="直線コネクタ 34"/>
-          <p:cNvCxnSpPr/>
-          <p:nvPr/>
-        </p:nvCxnSpPr>
-        <p:spPr>
-          <a:xfrm>
-            <a:off x="4481564" y="3451274"/>
-            <a:ext cx="1968473" cy="0"/>
-          </a:xfrm>
-          <a:prstGeom prst="line">
-            <a:avLst/>
-          </a:prstGeom>
-          <a:ln w="19050">
-            <a:solidFill>
-              <a:schemeClr val="tx1">
-                <a:lumMod val="75000"/>
-                <a:lumOff val="25000"/>
-              </a:schemeClr>
-            </a:solidFill>
-          </a:ln>
-        </p:spPr>
-        <p:style>
-          <a:lnRef idx="1">
-            <a:schemeClr val="accent1"/>
-          </a:lnRef>
-          <a:fillRef idx="0">
-            <a:schemeClr val="accent1"/>
-          </a:fillRef>
-          <a:effectRef idx="0">
-            <a:schemeClr val="accent1"/>
-          </a:effectRef>
-          <a:fontRef idx="minor">
-            <a:schemeClr val="tx1"/>
-          </a:fontRef>
-        </p:style>
-      </p:cxnSp>
-      <p:cxnSp>
-        <p:nvCxnSpPr>
-          <p:cNvPr id="36" name="直線コネクタ 35"/>
-          <p:cNvCxnSpPr/>
-          <p:nvPr/>
-        </p:nvCxnSpPr>
-        <p:spPr>
-          <a:xfrm>
-            <a:off x="6450037" y="3331028"/>
-            <a:ext cx="0" cy="240491"/>
-          </a:xfrm>
-          <a:prstGeom prst="line">
-            <a:avLst/>
-          </a:prstGeom>
-          <a:ln w="19050">
-            <a:solidFill>
-              <a:schemeClr val="tx1">
-                <a:lumMod val="75000"/>
-                <a:lumOff val="25000"/>
-              </a:schemeClr>
-            </a:solidFill>
-          </a:ln>
-        </p:spPr>
-        <p:style>
-          <a:lnRef idx="1">
-            <a:schemeClr val="accent1"/>
-          </a:lnRef>
-          <a:fillRef idx="0">
-            <a:schemeClr val="accent1"/>
-          </a:fillRef>
-          <a:effectRef idx="0">
-            <a:schemeClr val="accent1"/>
-          </a:effectRef>
-          <a:fontRef idx="minor">
-            <a:schemeClr val="tx1"/>
-          </a:fontRef>
-        </p:style>
-      </p:cxnSp>
-      <p:cxnSp>
-        <p:nvCxnSpPr>
-          <p:cNvPr id="37" name="直線コネクタ 36"/>
-          <p:cNvCxnSpPr/>
-          <p:nvPr/>
-        </p:nvCxnSpPr>
-        <p:spPr>
-          <a:xfrm>
-            <a:off x="4497976" y="3331028"/>
-            <a:ext cx="0" cy="240491"/>
-          </a:xfrm>
-          <a:prstGeom prst="line">
-            <a:avLst/>
-          </a:prstGeom>
-          <a:ln w="19050">
-            <a:solidFill>
-              <a:schemeClr val="tx1">
-                <a:lumMod val="75000"/>
-                <a:lumOff val="25000"/>
-              </a:schemeClr>
-            </a:solidFill>
-          </a:ln>
-        </p:spPr>
-        <p:style>
-          <a:lnRef idx="1">
-            <a:schemeClr val="accent1"/>
-          </a:lnRef>
-          <a:fillRef idx="0">
-            <a:schemeClr val="accent1"/>
-          </a:fillRef>
-          <a:effectRef idx="0">
-            <a:schemeClr val="accent1"/>
-          </a:effectRef>
-          <a:fontRef idx="minor">
-            <a:schemeClr val="tx1"/>
-          </a:fontRef>
-        </p:style>
-      </p:cxnSp>
-      <p:sp>
-        <p:nvSpPr>
-          <p:cNvPr id="40" name="テキスト ボックス 39"/>
-          <p:cNvSpPr txBox="1"/>
-          <p:nvPr/>
-        </p:nvSpPr>
-        <p:spPr>
-          <a:xfrm>
-            <a:off x="4481563" y="3426599"/>
-            <a:ext cx="2982351" cy="369332"/>
-          </a:xfrm>
-          <a:prstGeom prst="rect">
-            <a:avLst/>
-          </a:prstGeom>
-          <a:noFill/>
-        </p:spPr>
-        <p:txBody>
-          <a:bodyPr wrap="square" rtlCol="0">
-            <a:spAutoFit/>
-          </a:bodyPr>
-          <a:lstStyle/>
-          <a:p>
-            <a:r>
-              <a:rPr kumimoji="1" lang="en-US" altLang="ja-JP" dirty="0" smtClean="0"/>
-              <a:t>(280)</a:t>
-            </a:r>
-            <a:endParaRPr kumimoji="1" lang="ja-JP" altLang="en-US" dirty="0"/>
-          </a:p>
-        </p:txBody>
-      </p:sp>
-      <p:cxnSp>
-        <p:nvCxnSpPr>
-          <p:cNvPr id="41" name="直線コネクタ 40"/>
-          <p:cNvCxnSpPr/>
-          <p:nvPr/>
-        </p:nvCxnSpPr>
-        <p:spPr>
-          <a:xfrm>
-            <a:off x="5484082" y="2583654"/>
-            <a:ext cx="0" cy="1685891"/>
-          </a:xfrm>
-          <a:prstGeom prst="line">
-            <a:avLst/>
-          </a:prstGeom>
-          <a:ln w="19050">
-            <a:solidFill>
-              <a:schemeClr val="tx1">
-                <a:lumMod val="75000"/>
-                <a:lumOff val="25000"/>
-              </a:schemeClr>
-            </a:solidFill>
-          </a:ln>
-        </p:spPr>
-        <p:style>
-          <a:lnRef idx="1">
-            <a:schemeClr val="accent1"/>
-          </a:lnRef>
-          <a:fillRef idx="0">
-            <a:schemeClr val="accent1"/>
-          </a:fillRef>
-          <a:effectRef idx="0">
-            <a:schemeClr val="accent1"/>
-          </a:effectRef>
-          <a:fontRef idx="minor">
-            <a:schemeClr val="tx1"/>
-          </a:fontRef>
-        </p:style>
-      </p:cxnSp>
-      <p:cxnSp>
-        <p:nvCxnSpPr>
-          <p:cNvPr id="43" name="直線コネクタ 42"/>
-          <p:cNvCxnSpPr/>
-          <p:nvPr/>
-        </p:nvCxnSpPr>
-        <p:spPr>
-          <a:xfrm rot="5400000">
-            <a:off x="5484081" y="2468210"/>
-            <a:ext cx="0" cy="240491"/>
-          </a:xfrm>
-          <a:prstGeom prst="line">
-            <a:avLst/>
-          </a:prstGeom>
-          <a:ln w="19050">
-            <a:solidFill>
-              <a:schemeClr val="tx1">
-                <a:lumMod val="75000"/>
-                <a:lumOff val="25000"/>
-              </a:schemeClr>
-            </a:solidFill>
-          </a:ln>
-        </p:spPr>
-        <p:style>
-          <a:lnRef idx="1">
-            <a:schemeClr val="accent1"/>
-          </a:lnRef>
-          <a:fillRef idx="0">
-            <a:schemeClr val="accent1"/>
-          </a:fillRef>
-          <a:effectRef idx="0">
-            <a:schemeClr val="accent1"/>
-          </a:effectRef>
-          <a:fontRef idx="minor">
-            <a:schemeClr val="tx1"/>
-          </a:fontRef>
-        </p:style>
-      </p:cxnSp>
-      <p:cxnSp>
-        <p:nvCxnSpPr>
-          <p:cNvPr id="44" name="直線コネクタ 43"/>
-          <p:cNvCxnSpPr/>
-          <p:nvPr/>
-        </p:nvCxnSpPr>
-        <p:spPr>
-          <a:xfrm rot="5400000">
-            <a:off x="5484080" y="4137462"/>
-            <a:ext cx="0" cy="240491"/>
-          </a:xfrm>
-          <a:prstGeom prst="line">
-            <a:avLst/>
-          </a:prstGeom>
-          <a:ln w="19050">
-            <a:solidFill>
-              <a:schemeClr val="tx1">
-                <a:lumMod val="75000"/>
-                <a:lumOff val="25000"/>
-              </a:schemeClr>
-            </a:solidFill>
-          </a:ln>
-        </p:spPr>
-        <p:style>
-          <a:lnRef idx="1">
-            <a:schemeClr val="accent1"/>
-          </a:lnRef>
-          <a:fillRef idx="0">
-            <a:schemeClr val="accent1"/>
-          </a:fillRef>
-          <a:effectRef idx="0">
-            <a:schemeClr val="accent1"/>
-          </a:effectRef>
-          <a:fontRef idx="minor">
-            <a:schemeClr val="tx1"/>
-          </a:fontRef>
-        </p:style>
-      </p:cxnSp>
-      <p:sp>
-        <p:nvSpPr>
-          <p:cNvPr id="45" name="テキスト ボックス 44"/>
-          <p:cNvSpPr txBox="1"/>
-          <p:nvPr/>
-        </p:nvSpPr>
-        <p:spPr>
-          <a:xfrm>
-            <a:off x="5459964" y="2561281"/>
-            <a:ext cx="2982351" cy="369332"/>
-          </a:xfrm>
-          <a:prstGeom prst="rect">
-            <a:avLst/>
-          </a:prstGeom>
-          <a:noFill/>
-        </p:spPr>
-        <p:txBody>
-          <a:bodyPr wrap="square" rtlCol="0">
-            <a:spAutoFit/>
-          </a:bodyPr>
-          <a:lstStyle/>
-          <a:p>
-            <a:r>
-              <a:rPr kumimoji="1" lang="en-US" altLang="ja-JP" dirty="0" smtClean="0"/>
-              <a:t>(240)</a:t>
-            </a:r>
-            <a:endParaRPr kumimoji="1" lang="ja-JP" altLang="en-US" dirty="0"/>
-          </a:p>
-        </p:txBody>
-      </p:sp>
+        </p:grpSpPr>
+        <p:pic>
+          <p:nvPicPr>
+            <p:cNvPr id="5" name="図 4"/>
+            <p:cNvPicPr>
+              <a:picLocks noChangeAspect="1"/>
+            </p:cNvPicPr>
+            <p:nvPr/>
+          </p:nvPicPr>
+          <p:blipFill rotWithShape="1">
+            <a:blip r:embed="rId2">
+              <a:extLst>
+                <a:ext uri="{28A0092B-C50C-407E-A947-70E740481C1C}">
+                  <a14:useLocalDpi xmlns:a14="http://schemas.microsoft.com/office/drawing/2010/main" val="0"/>
+                </a:ext>
+              </a:extLst>
+            </a:blip>
+            <a:srcRect l="5386" t="11129" r="5803" b="15852"/>
+            <a:stretch/>
+          </p:blipFill>
+          <p:spPr>
+            <a:xfrm>
+              <a:off x="3799269" y="1468192"/>
+              <a:ext cx="4572000" cy="3683358"/>
+            </a:xfrm>
+            <a:prstGeom prst="rect">
+              <a:avLst/>
+            </a:prstGeom>
+          </p:spPr>
+        </p:pic>
+        <p:cxnSp>
+          <p:nvCxnSpPr>
+            <p:cNvPr id="10" name="直線コネクタ 9"/>
+            <p:cNvCxnSpPr/>
+            <p:nvPr/>
+          </p:nvCxnSpPr>
+          <p:spPr>
+            <a:xfrm>
+              <a:off x="3846173" y="2463409"/>
+              <a:ext cx="0" cy="240491"/>
+            </a:xfrm>
+            <a:prstGeom prst="line">
+              <a:avLst/>
+            </a:prstGeom>
+            <a:ln w="19050">
+              <a:solidFill>
+                <a:schemeClr val="tx1">
+                  <a:lumMod val="75000"/>
+                  <a:lumOff val="25000"/>
+                </a:schemeClr>
+              </a:solidFill>
+            </a:ln>
+          </p:spPr>
+          <p:style>
+            <a:lnRef idx="1">
+              <a:schemeClr val="accent1"/>
+            </a:lnRef>
+            <a:fillRef idx="0">
+              <a:schemeClr val="accent1"/>
+            </a:fillRef>
+            <a:effectRef idx="0">
+              <a:schemeClr val="accent1"/>
+            </a:effectRef>
+            <a:fontRef idx="minor">
+              <a:schemeClr val="tx1"/>
+            </a:fontRef>
+          </p:style>
+        </p:cxnSp>
+        <p:sp>
+          <p:nvSpPr>
+            <p:cNvPr id="15" name="テキスト ボックス 14"/>
+            <p:cNvSpPr txBox="1"/>
+            <p:nvPr/>
+          </p:nvSpPr>
+          <p:spPr>
+            <a:xfrm>
+              <a:off x="3846173" y="2243798"/>
+              <a:ext cx="2982351" cy="369332"/>
+            </a:xfrm>
+            <a:prstGeom prst="rect">
+              <a:avLst/>
+            </a:prstGeom>
+            <a:noFill/>
+          </p:spPr>
+          <p:txBody>
+            <a:bodyPr wrap="square" rtlCol="0">
+              <a:spAutoFit/>
+            </a:bodyPr>
+            <a:lstStyle/>
+            <a:p>
+              <a:r>
+                <a:rPr kumimoji="1" lang="en-US" altLang="ja-JP" dirty="0" smtClean="0"/>
+                <a:t>(90)</a:t>
+              </a:r>
+              <a:endParaRPr kumimoji="1" lang="ja-JP" altLang="en-US" dirty="0"/>
+            </a:p>
+          </p:txBody>
+        </p:sp>
+        <p:cxnSp>
+          <p:nvCxnSpPr>
+            <p:cNvPr id="14" name="直線コネクタ 13"/>
+            <p:cNvCxnSpPr/>
+            <p:nvPr/>
+          </p:nvCxnSpPr>
+          <p:spPr>
+            <a:xfrm>
+              <a:off x="3846173" y="2581555"/>
+              <a:ext cx="635391" cy="0"/>
+            </a:xfrm>
+            <a:prstGeom prst="line">
+              <a:avLst/>
+            </a:prstGeom>
+            <a:ln w="19050">
+              <a:solidFill>
+                <a:schemeClr val="tx1">
+                  <a:lumMod val="75000"/>
+                  <a:lumOff val="25000"/>
+                </a:schemeClr>
+              </a:solidFill>
+            </a:ln>
+          </p:spPr>
+          <p:style>
+            <a:lnRef idx="1">
+              <a:schemeClr val="accent1"/>
+            </a:lnRef>
+            <a:fillRef idx="0">
+              <a:schemeClr val="accent1"/>
+            </a:fillRef>
+            <a:effectRef idx="0">
+              <a:schemeClr val="accent1"/>
+            </a:effectRef>
+            <a:fontRef idx="minor">
+              <a:schemeClr val="tx1"/>
+            </a:fontRef>
+          </p:style>
+        </p:cxnSp>
+        <p:cxnSp>
+          <p:nvCxnSpPr>
+            <p:cNvPr id="20" name="直線コネクタ 19"/>
+            <p:cNvCxnSpPr/>
+            <p:nvPr/>
+          </p:nvCxnSpPr>
+          <p:spPr>
+            <a:xfrm rot="5400000">
+              <a:off x="4485080" y="1624152"/>
+              <a:ext cx="0" cy="240491"/>
+            </a:xfrm>
+            <a:prstGeom prst="line">
+              <a:avLst/>
+            </a:prstGeom>
+            <a:ln w="19050">
+              <a:solidFill>
+                <a:schemeClr val="tx1">
+                  <a:lumMod val="75000"/>
+                  <a:lumOff val="25000"/>
+                </a:schemeClr>
+              </a:solidFill>
+            </a:ln>
+          </p:spPr>
+          <p:style>
+            <a:lnRef idx="1">
+              <a:schemeClr val="accent1"/>
+            </a:lnRef>
+            <a:fillRef idx="0">
+              <a:schemeClr val="accent1"/>
+            </a:fillRef>
+            <a:effectRef idx="0">
+              <a:schemeClr val="accent1"/>
+            </a:effectRef>
+            <a:fontRef idx="minor">
+              <a:schemeClr val="tx1"/>
+            </a:fontRef>
+          </p:style>
+        </p:cxnSp>
+        <p:cxnSp>
+          <p:nvCxnSpPr>
+            <p:cNvPr id="22" name="直線コネクタ 21"/>
+            <p:cNvCxnSpPr/>
+            <p:nvPr/>
+          </p:nvCxnSpPr>
+          <p:spPr>
+            <a:xfrm>
+              <a:off x="4492115" y="1744397"/>
+              <a:ext cx="0" cy="844058"/>
+            </a:xfrm>
+            <a:prstGeom prst="line">
+              <a:avLst/>
+            </a:prstGeom>
+            <a:ln w="19050">
+              <a:solidFill>
+                <a:schemeClr val="tx1">
+                  <a:lumMod val="75000"/>
+                  <a:lumOff val="25000"/>
+                </a:schemeClr>
+              </a:solidFill>
+            </a:ln>
+          </p:spPr>
+          <p:style>
+            <a:lnRef idx="1">
+              <a:schemeClr val="accent1"/>
+            </a:lnRef>
+            <a:fillRef idx="0">
+              <a:schemeClr val="accent1"/>
+            </a:fillRef>
+            <a:effectRef idx="0">
+              <a:schemeClr val="accent1"/>
+            </a:effectRef>
+            <a:fontRef idx="minor">
+              <a:schemeClr val="tx1"/>
+            </a:fontRef>
+          </p:style>
+        </p:cxnSp>
+        <p:sp>
+          <p:nvSpPr>
+            <p:cNvPr id="33" name="テキスト ボックス 32"/>
+            <p:cNvSpPr txBox="1"/>
+            <p:nvPr/>
+          </p:nvSpPr>
+          <p:spPr>
+            <a:xfrm>
+              <a:off x="4481563" y="1756793"/>
+              <a:ext cx="2982351" cy="369332"/>
+            </a:xfrm>
+            <a:prstGeom prst="rect">
+              <a:avLst/>
+            </a:prstGeom>
+            <a:noFill/>
+          </p:spPr>
+          <p:txBody>
+            <a:bodyPr wrap="square" rtlCol="0">
+              <a:spAutoFit/>
+            </a:bodyPr>
+            <a:lstStyle/>
+            <a:p>
+              <a:r>
+                <a:rPr kumimoji="1" lang="en-US" altLang="ja-JP" dirty="0" smtClean="0"/>
+                <a:t>(120)</a:t>
+              </a:r>
+              <a:endParaRPr kumimoji="1" lang="ja-JP" altLang="en-US" dirty="0"/>
+            </a:p>
+          </p:txBody>
+        </p:sp>
+        <p:cxnSp>
+          <p:nvCxnSpPr>
+            <p:cNvPr id="35" name="直線コネクタ 34"/>
+            <p:cNvCxnSpPr/>
+            <p:nvPr/>
+          </p:nvCxnSpPr>
+          <p:spPr>
+            <a:xfrm>
+              <a:off x="4481564" y="3451274"/>
+              <a:ext cx="1968473" cy="0"/>
+            </a:xfrm>
+            <a:prstGeom prst="line">
+              <a:avLst/>
+            </a:prstGeom>
+            <a:ln w="19050">
+              <a:solidFill>
+                <a:schemeClr val="tx1">
+                  <a:lumMod val="75000"/>
+                  <a:lumOff val="25000"/>
+                </a:schemeClr>
+              </a:solidFill>
+            </a:ln>
+          </p:spPr>
+          <p:style>
+            <a:lnRef idx="1">
+              <a:schemeClr val="accent1"/>
+            </a:lnRef>
+            <a:fillRef idx="0">
+              <a:schemeClr val="accent1"/>
+            </a:fillRef>
+            <a:effectRef idx="0">
+              <a:schemeClr val="accent1"/>
+            </a:effectRef>
+            <a:fontRef idx="minor">
+              <a:schemeClr val="tx1"/>
+            </a:fontRef>
+          </p:style>
+        </p:cxnSp>
+        <p:cxnSp>
+          <p:nvCxnSpPr>
+            <p:cNvPr id="36" name="直線コネクタ 35"/>
+            <p:cNvCxnSpPr/>
+            <p:nvPr/>
+          </p:nvCxnSpPr>
+          <p:spPr>
+            <a:xfrm>
+              <a:off x="6450037" y="3331028"/>
+              <a:ext cx="0" cy="240491"/>
+            </a:xfrm>
+            <a:prstGeom prst="line">
+              <a:avLst/>
+            </a:prstGeom>
+            <a:ln w="19050">
+              <a:solidFill>
+                <a:schemeClr val="tx1">
+                  <a:lumMod val="75000"/>
+                  <a:lumOff val="25000"/>
+                </a:schemeClr>
+              </a:solidFill>
+            </a:ln>
+          </p:spPr>
+          <p:style>
+            <a:lnRef idx="1">
+              <a:schemeClr val="accent1"/>
+            </a:lnRef>
+            <a:fillRef idx="0">
+              <a:schemeClr val="accent1"/>
+            </a:fillRef>
+            <a:effectRef idx="0">
+              <a:schemeClr val="accent1"/>
+            </a:effectRef>
+            <a:fontRef idx="minor">
+              <a:schemeClr val="tx1"/>
+            </a:fontRef>
+          </p:style>
+        </p:cxnSp>
+        <p:cxnSp>
+          <p:nvCxnSpPr>
+            <p:cNvPr id="37" name="直線コネクタ 36"/>
+            <p:cNvCxnSpPr/>
+            <p:nvPr/>
+          </p:nvCxnSpPr>
+          <p:spPr>
+            <a:xfrm>
+              <a:off x="4497976" y="3331028"/>
+              <a:ext cx="0" cy="240491"/>
+            </a:xfrm>
+            <a:prstGeom prst="line">
+              <a:avLst/>
+            </a:prstGeom>
+            <a:ln w="19050">
+              <a:solidFill>
+                <a:schemeClr val="tx1">
+                  <a:lumMod val="75000"/>
+                  <a:lumOff val="25000"/>
+                </a:schemeClr>
+              </a:solidFill>
+            </a:ln>
+          </p:spPr>
+          <p:style>
+            <a:lnRef idx="1">
+              <a:schemeClr val="accent1"/>
+            </a:lnRef>
+            <a:fillRef idx="0">
+              <a:schemeClr val="accent1"/>
+            </a:fillRef>
+            <a:effectRef idx="0">
+              <a:schemeClr val="accent1"/>
+            </a:effectRef>
+            <a:fontRef idx="minor">
+              <a:schemeClr val="tx1"/>
+            </a:fontRef>
+          </p:style>
+        </p:cxnSp>
+        <p:sp>
+          <p:nvSpPr>
+            <p:cNvPr id="40" name="テキスト ボックス 39"/>
+            <p:cNvSpPr txBox="1"/>
+            <p:nvPr/>
+          </p:nvSpPr>
+          <p:spPr>
+            <a:xfrm>
+              <a:off x="4481563" y="3426599"/>
+              <a:ext cx="2982351" cy="369332"/>
+            </a:xfrm>
+            <a:prstGeom prst="rect">
+              <a:avLst/>
+            </a:prstGeom>
+            <a:noFill/>
+          </p:spPr>
+          <p:txBody>
+            <a:bodyPr wrap="square" rtlCol="0">
+              <a:spAutoFit/>
+            </a:bodyPr>
+            <a:lstStyle/>
+            <a:p>
+              <a:r>
+                <a:rPr kumimoji="1" lang="en-US" altLang="ja-JP" dirty="0" smtClean="0"/>
+                <a:t>(280)</a:t>
+              </a:r>
+              <a:endParaRPr kumimoji="1" lang="ja-JP" altLang="en-US" dirty="0"/>
+            </a:p>
+          </p:txBody>
+        </p:sp>
+        <p:cxnSp>
+          <p:nvCxnSpPr>
+            <p:cNvPr id="41" name="直線コネクタ 40"/>
+            <p:cNvCxnSpPr/>
+            <p:nvPr/>
+          </p:nvCxnSpPr>
+          <p:spPr>
+            <a:xfrm>
+              <a:off x="5484082" y="2583654"/>
+              <a:ext cx="0" cy="1685891"/>
+            </a:xfrm>
+            <a:prstGeom prst="line">
+              <a:avLst/>
+            </a:prstGeom>
+            <a:ln w="19050">
+              <a:solidFill>
+                <a:schemeClr val="tx1">
+                  <a:lumMod val="75000"/>
+                  <a:lumOff val="25000"/>
+                </a:schemeClr>
+              </a:solidFill>
+            </a:ln>
+          </p:spPr>
+          <p:style>
+            <a:lnRef idx="1">
+              <a:schemeClr val="accent1"/>
+            </a:lnRef>
+            <a:fillRef idx="0">
+              <a:schemeClr val="accent1"/>
+            </a:fillRef>
+            <a:effectRef idx="0">
+              <a:schemeClr val="accent1"/>
+            </a:effectRef>
+            <a:fontRef idx="minor">
+              <a:schemeClr val="tx1"/>
+            </a:fontRef>
+          </p:style>
+        </p:cxnSp>
+        <p:cxnSp>
+          <p:nvCxnSpPr>
+            <p:cNvPr id="43" name="直線コネクタ 42"/>
+            <p:cNvCxnSpPr/>
+            <p:nvPr/>
+          </p:nvCxnSpPr>
+          <p:spPr>
+            <a:xfrm rot="5400000">
+              <a:off x="5484081" y="2468210"/>
+              <a:ext cx="0" cy="240491"/>
+            </a:xfrm>
+            <a:prstGeom prst="line">
+              <a:avLst/>
+            </a:prstGeom>
+            <a:ln w="19050">
+              <a:solidFill>
+                <a:schemeClr val="tx1">
+                  <a:lumMod val="75000"/>
+                  <a:lumOff val="25000"/>
+                </a:schemeClr>
+              </a:solidFill>
+            </a:ln>
+          </p:spPr>
+          <p:style>
+            <a:lnRef idx="1">
+              <a:schemeClr val="accent1"/>
+            </a:lnRef>
+            <a:fillRef idx="0">
+              <a:schemeClr val="accent1"/>
+            </a:fillRef>
+            <a:effectRef idx="0">
+              <a:schemeClr val="accent1"/>
+            </a:effectRef>
+            <a:fontRef idx="minor">
+              <a:schemeClr val="tx1"/>
+            </a:fontRef>
+          </p:style>
+        </p:cxnSp>
+        <p:cxnSp>
+          <p:nvCxnSpPr>
+            <p:cNvPr id="44" name="直線コネクタ 43"/>
+            <p:cNvCxnSpPr/>
+            <p:nvPr/>
+          </p:nvCxnSpPr>
+          <p:spPr>
+            <a:xfrm rot="5400000">
+              <a:off x="5484080" y="4137462"/>
+              <a:ext cx="0" cy="240491"/>
+            </a:xfrm>
+            <a:prstGeom prst="line">
+              <a:avLst/>
+            </a:prstGeom>
+            <a:ln w="19050">
+              <a:solidFill>
+                <a:schemeClr val="tx1">
+                  <a:lumMod val="75000"/>
+                  <a:lumOff val="25000"/>
+                </a:schemeClr>
+              </a:solidFill>
+            </a:ln>
+          </p:spPr>
+          <p:style>
+            <a:lnRef idx="1">
+              <a:schemeClr val="accent1"/>
+            </a:lnRef>
+            <a:fillRef idx="0">
+              <a:schemeClr val="accent1"/>
+            </a:fillRef>
+            <a:effectRef idx="0">
+              <a:schemeClr val="accent1"/>
+            </a:effectRef>
+            <a:fontRef idx="minor">
+              <a:schemeClr val="tx1"/>
+            </a:fontRef>
+          </p:style>
+        </p:cxnSp>
+        <p:sp>
+          <p:nvSpPr>
+            <p:cNvPr id="45" name="テキスト ボックス 44"/>
+            <p:cNvSpPr txBox="1"/>
+            <p:nvPr/>
+          </p:nvSpPr>
+          <p:spPr>
+            <a:xfrm>
+              <a:off x="5459964" y="2561281"/>
+              <a:ext cx="2982351" cy="369332"/>
+            </a:xfrm>
+            <a:prstGeom prst="rect">
+              <a:avLst/>
+            </a:prstGeom>
+            <a:noFill/>
+          </p:spPr>
+          <p:txBody>
+            <a:bodyPr wrap="square" rtlCol="0">
+              <a:spAutoFit/>
+            </a:bodyPr>
+            <a:lstStyle/>
+            <a:p>
+              <a:r>
+                <a:rPr kumimoji="1" lang="en-US" altLang="ja-JP" dirty="0" smtClean="0"/>
+                <a:t>(240)</a:t>
+              </a:r>
+              <a:endParaRPr kumimoji="1" lang="ja-JP" altLang="en-US" dirty="0"/>
+            </a:p>
+          </p:txBody>
+        </p:sp>
+      </p:grpSp>
     </p:spTree>
     <p:extLst>
       <p:ext uri="{BB962C8B-B14F-4D97-AF65-F5344CB8AC3E}">
@@ -3913,643 +3848,582 @@
           <a:chExt cx="0" cy="0"/>
         </a:xfrm>
       </p:grpSpPr>
-      <p:pic>
-        <p:nvPicPr>
-          <p:cNvPr id="5" name="図 4"/>
-          <p:cNvPicPr>
-            <a:picLocks noChangeAspect="1"/>
-          </p:cNvPicPr>
+      <p:grpSp>
+        <p:nvGrpSpPr>
+          <p:cNvPr id="3" name="図形グループ 2"/>
+          <p:cNvGrpSpPr/>
           <p:nvPr/>
-        </p:nvPicPr>
-        <p:blipFill rotWithShape="1">
-          <a:blip r:embed="rId2">
-            <a:extLst>
-              <a:ext uri="{28A0092B-C50C-407E-A947-70E740481C1C}">
-                <a14:useLocalDpi xmlns:a14="http://schemas.microsoft.com/office/drawing/2010/main" val="0"/>
-              </a:ext>
-            </a:extLst>
-          </a:blip>
-          <a:srcRect l="5792" t="11480" r="5423" b="15634"/>
-          <a:stretch/>
-        </p:blipFill>
-        <p:spPr>
+        </p:nvGrpSpPr>
+        <p:grpSpPr>
           <a:xfrm>
             <a:off x="3810001" y="1485899"/>
-            <a:ext cx="4591050" cy="3676651"/>
+            <a:ext cx="4632314" cy="3676651"/>
+            <a:chOff x="3810001" y="1485899"/>
+            <a:chExt cx="4632314" cy="3676651"/>
           </a:xfrm>
-          <a:prstGeom prst="rect">
-            <a:avLst/>
-          </a:prstGeom>
-        </p:spPr>
-      </p:pic>
-      <p:cxnSp>
-        <p:nvCxnSpPr>
-          <p:cNvPr id="8" name="直線コネクタ 7"/>
-          <p:cNvCxnSpPr/>
-          <p:nvPr/>
-        </p:nvCxnSpPr>
-        <p:spPr>
-          <a:xfrm>
-            <a:off x="4481564" y="2463409"/>
-            <a:ext cx="0" cy="240491"/>
-          </a:xfrm>
-          <a:prstGeom prst="line">
-            <a:avLst/>
-          </a:prstGeom>
-          <a:ln w="19050">
-            <a:solidFill>
-              <a:schemeClr val="tx1">
-                <a:lumMod val="75000"/>
-                <a:lumOff val="25000"/>
-              </a:schemeClr>
-            </a:solidFill>
-          </a:ln>
-        </p:spPr>
-        <p:style>
-          <a:lnRef idx="1">
-            <a:schemeClr val="accent1"/>
-          </a:lnRef>
-          <a:fillRef idx="0">
-            <a:schemeClr val="accent1"/>
-          </a:fillRef>
-          <a:effectRef idx="0">
-            <a:schemeClr val="accent1"/>
-          </a:effectRef>
-          <a:fontRef idx="minor">
-            <a:schemeClr val="tx1"/>
-          </a:fontRef>
-        </p:style>
-      </p:cxnSp>
-      <p:cxnSp>
-        <p:nvCxnSpPr>
-          <p:cNvPr id="10" name="直線コネクタ 9"/>
-          <p:cNvCxnSpPr/>
-          <p:nvPr/>
-        </p:nvCxnSpPr>
-        <p:spPr>
-          <a:xfrm>
-            <a:off x="3846173" y="2463409"/>
-            <a:ext cx="0" cy="240491"/>
-          </a:xfrm>
-          <a:prstGeom prst="line">
-            <a:avLst/>
-          </a:prstGeom>
-          <a:ln w="19050">
-            <a:solidFill>
-              <a:schemeClr val="tx1">
-                <a:lumMod val="75000"/>
-                <a:lumOff val="25000"/>
-              </a:schemeClr>
-            </a:solidFill>
-          </a:ln>
-        </p:spPr>
-        <p:style>
-          <a:lnRef idx="1">
-            <a:schemeClr val="accent1"/>
-          </a:lnRef>
-          <a:fillRef idx="0">
-            <a:schemeClr val="accent1"/>
-          </a:fillRef>
-          <a:effectRef idx="0">
-            <a:schemeClr val="accent1"/>
-          </a:effectRef>
-          <a:fontRef idx="minor">
-            <a:schemeClr val="tx1"/>
-          </a:fontRef>
-        </p:style>
-      </p:cxnSp>
-      <p:cxnSp>
-        <p:nvCxnSpPr>
-          <p:cNvPr id="14" name="直線コネクタ 13"/>
-          <p:cNvCxnSpPr/>
-          <p:nvPr/>
-        </p:nvCxnSpPr>
-        <p:spPr>
-          <a:xfrm>
-            <a:off x="3846173" y="2583654"/>
-            <a:ext cx="635391" cy="0"/>
-          </a:xfrm>
-          <a:prstGeom prst="line">
-            <a:avLst/>
-          </a:prstGeom>
-          <a:ln w="19050">
-            <a:solidFill>
-              <a:schemeClr val="tx1">
-                <a:lumMod val="75000"/>
-                <a:lumOff val="25000"/>
-              </a:schemeClr>
-            </a:solidFill>
-          </a:ln>
-        </p:spPr>
-        <p:style>
-          <a:lnRef idx="1">
-            <a:schemeClr val="accent1"/>
-          </a:lnRef>
-          <a:fillRef idx="0">
-            <a:schemeClr val="accent1"/>
-          </a:fillRef>
-          <a:effectRef idx="0">
-            <a:schemeClr val="accent1"/>
-          </a:effectRef>
-          <a:fontRef idx="minor">
-            <a:schemeClr val="tx1"/>
-          </a:fontRef>
-        </p:style>
-      </p:cxnSp>
-      <p:sp>
-        <p:nvSpPr>
-          <p:cNvPr id="15" name="テキスト ボックス 14"/>
-          <p:cNvSpPr txBox="1"/>
-          <p:nvPr/>
-        </p:nvSpPr>
-        <p:spPr>
-          <a:xfrm>
-            <a:off x="3846173" y="2243798"/>
-            <a:ext cx="2982351" cy="369332"/>
-          </a:xfrm>
-          <a:prstGeom prst="rect">
-            <a:avLst/>
-          </a:prstGeom>
-          <a:noFill/>
-        </p:spPr>
-        <p:txBody>
-          <a:bodyPr wrap="square" rtlCol="0">
-            <a:spAutoFit/>
-          </a:bodyPr>
-          <a:lstStyle/>
-          <a:p>
-            <a:r>
-              <a:rPr kumimoji="1" lang="en-US" altLang="ja-JP" dirty="0" smtClean="0"/>
-              <a:t>(</a:t>
-            </a:r>
-            <a:r>
-              <a:rPr lang="en-US" altLang="ja-JP" dirty="0"/>
-              <a:t>x</a:t>
-            </a:r>
-            <a:r>
-              <a:rPr kumimoji="1" lang="en-US" altLang="ja-JP" dirty="0" smtClean="0"/>
-              <a:t>)</a:t>
-            </a:r>
-            <a:endParaRPr kumimoji="1" lang="ja-JP" altLang="en-US" dirty="0"/>
-          </a:p>
-        </p:txBody>
-      </p:sp>
-      <p:cxnSp>
-        <p:nvCxnSpPr>
-          <p:cNvPr id="20" name="直線コネクタ 19"/>
-          <p:cNvCxnSpPr/>
-          <p:nvPr/>
-        </p:nvCxnSpPr>
-        <p:spPr>
-          <a:xfrm rot="5400000">
-            <a:off x="4485080" y="1624152"/>
-            <a:ext cx="0" cy="240491"/>
-          </a:xfrm>
-          <a:prstGeom prst="line">
-            <a:avLst/>
-          </a:prstGeom>
-          <a:ln w="19050">
-            <a:solidFill>
-              <a:schemeClr val="tx1">
-                <a:lumMod val="75000"/>
-                <a:lumOff val="25000"/>
-              </a:schemeClr>
-            </a:solidFill>
-          </a:ln>
-        </p:spPr>
-        <p:style>
-          <a:lnRef idx="1">
-            <a:schemeClr val="accent1"/>
-          </a:lnRef>
-          <a:fillRef idx="0">
-            <a:schemeClr val="accent1"/>
-          </a:fillRef>
-          <a:effectRef idx="0">
-            <a:schemeClr val="accent1"/>
-          </a:effectRef>
-          <a:fontRef idx="minor">
-            <a:schemeClr val="tx1"/>
-          </a:fontRef>
-        </p:style>
-      </p:cxnSp>
-      <p:cxnSp>
-        <p:nvCxnSpPr>
-          <p:cNvPr id="21" name="直線コネクタ 20"/>
-          <p:cNvCxnSpPr/>
-          <p:nvPr/>
-        </p:nvCxnSpPr>
-        <p:spPr>
-          <a:xfrm rot="5400000">
-            <a:off x="4485081" y="2463409"/>
-            <a:ext cx="0" cy="240491"/>
-          </a:xfrm>
-          <a:prstGeom prst="line">
-            <a:avLst/>
-          </a:prstGeom>
-          <a:ln w="19050">
-            <a:solidFill>
-              <a:schemeClr val="tx1">
-                <a:lumMod val="75000"/>
-                <a:lumOff val="25000"/>
-              </a:schemeClr>
-            </a:solidFill>
-          </a:ln>
-        </p:spPr>
-        <p:style>
-          <a:lnRef idx="1">
-            <a:schemeClr val="accent1"/>
-          </a:lnRef>
-          <a:fillRef idx="0">
-            <a:schemeClr val="accent1"/>
-          </a:fillRef>
-          <a:effectRef idx="0">
-            <a:schemeClr val="accent1"/>
-          </a:effectRef>
-          <a:fontRef idx="minor">
-            <a:schemeClr val="tx1"/>
-          </a:fontRef>
-        </p:style>
-      </p:cxnSp>
-      <p:cxnSp>
-        <p:nvCxnSpPr>
-          <p:cNvPr id="22" name="直線コネクタ 21"/>
-          <p:cNvCxnSpPr/>
-          <p:nvPr/>
-        </p:nvCxnSpPr>
-        <p:spPr>
-          <a:xfrm>
-            <a:off x="4485081" y="1744397"/>
-            <a:ext cx="0" cy="844058"/>
-          </a:xfrm>
-          <a:prstGeom prst="line">
-            <a:avLst/>
-          </a:prstGeom>
-          <a:ln w="19050">
-            <a:solidFill>
-              <a:schemeClr val="tx1">
-                <a:lumMod val="75000"/>
-                <a:lumOff val="25000"/>
-              </a:schemeClr>
-            </a:solidFill>
-          </a:ln>
-        </p:spPr>
-        <p:style>
-          <a:lnRef idx="1">
-            <a:schemeClr val="accent1"/>
-          </a:lnRef>
-          <a:fillRef idx="0">
-            <a:schemeClr val="accent1"/>
-          </a:fillRef>
-          <a:effectRef idx="0">
-            <a:schemeClr val="accent1"/>
-          </a:effectRef>
-          <a:fontRef idx="minor">
-            <a:schemeClr val="tx1"/>
-          </a:fontRef>
-        </p:style>
-      </p:cxnSp>
-      <p:sp>
-        <p:nvSpPr>
-          <p:cNvPr id="33" name="テキスト ボックス 32"/>
-          <p:cNvSpPr txBox="1"/>
-          <p:nvPr/>
-        </p:nvSpPr>
-        <p:spPr>
-          <a:xfrm>
-            <a:off x="4481563" y="1756793"/>
-            <a:ext cx="2982351" cy="369332"/>
-          </a:xfrm>
-          <a:prstGeom prst="rect">
-            <a:avLst/>
-          </a:prstGeom>
-          <a:noFill/>
-        </p:spPr>
-        <p:txBody>
-          <a:bodyPr wrap="square" rtlCol="0">
-            <a:spAutoFit/>
-          </a:bodyPr>
-          <a:lstStyle/>
-          <a:p>
-            <a:r>
-              <a:rPr kumimoji="1" lang="en-US" altLang="ja-JP" dirty="0" smtClean="0"/>
-              <a:t>(</a:t>
-            </a:r>
-            <a:r>
-              <a:rPr lang="en-US" altLang="ja-JP" dirty="0"/>
-              <a:t>y</a:t>
-            </a:r>
-            <a:r>
-              <a:rPr kumimoji="1" lang="en-US" altLang="ja-JP" dirty="0" smtClean="0"/>
-              <a:t>)</a:t>
-            </a:r>
-            <a:endParaRPr kumimoji="1" lang="ja-JP" altLang="en-US" dirty="0"/>
-          </a:p>
-        </p:txBody>
-      </p:sp>
-      <p:cxnSp>
-        <p:nvCxnSpPr>
-          <p:cNvPr id="35" name="直線コネクタ 34"/>
-          <p:cNvCxnSpPr/>
-          <p:nvPr/>
-        </p:nvCxnSpPr>
-        <p:spPr>
-          <a:xfrm>
-            <a:off x="4481564" y="3451274"/>
-            <a:ext cx="1968473" cy="0"/>
-          </a:xfrm>
-          <a:prstGeom prst="line">
-            <a:avLst/>
-          </a:prstGeom>
-          <a:ln w="19050">
-            <a:solidFill>
-              <a:schemeClr val="tx1">
-                <a:lumMod val="75000"/>
-                <a:lumOff val="25000"/>
-              </a:schemeClr>
-            </a:solidFill>
-          </a:ln>
-        </p:spPr>
-        <p:style>
-          <a:lnRef idx="1">
-            <a:schemeClr val="accent1"/>
-          </a:lnRef>
-          <a:fillRef idx="0">
-            <a:schemeClr val="accent1"/>
-          </a:fillRef>
-          <a:effectRef idx="0">
-            <a:schemeClr val="accent1"/>
-          </a:effectRef>
-          <a:fontRef idx="minor">
-            <a:schemeClr val="tx1"/>
-          </a:fontRef>
-        </p:style>
-      </p:cxnSp>
-      <p:cxnSp>
-        <p:nvCxnSpPr>
-          <p:cNvPr id="36" name="直線コネクタ 35"/>
-          <p:cNvCxnSpPr/>
-          <p:nvPr/>
-        </p:nvCxnSpPr>
-        <p:spPr>
-          <a:xfrm>
-            <a:off x="6450037" y="3331028"/>
-            <a:ext cx="0" cy="240491"/>
-          </a:xfrm>
-          <a:prstGeom prst="line">
-            <a:avLst/>
-          </a:prstGeom>
-          <a:ln w="19050">
-            <a:solidFill>
-              <a:schemeClr val="tx1">
-                <a:lumMod val="75000"/>
-                <a:lumOff val="25000"/>
-              </a:schemeClr>
-            </a:solidFill>
-          </a:ln>
-        </p:spPr>
-        <p:style>
-          <a:lnRef idx="1">
-            <a:schemeClr val="accent1"/>
-          </a:lnRef>
-          <a:fillRef idx="0">
-            <a:schemeClr val="accent1"/>
-          </a:fillRef>
-          <a:effectRef idx="0">
-            <a:schemeClr val="accent1"/>
-          </a:effectRef>
-          <a:fontRef idx="minor">
-            <a:schemeClr val="tx1"/>
-          </a:fontRef>
-        </p:style>
-      </p:cxnSp>
-      <p:cxnSp>
-        <p:nvCxnSpPr>
-          <p:cNvPr id="37" name="直線コネクタ 36"/>
-          <p:cNvCxnSpPr/>
-          <p:nvPr/>
-        </p:nvCxnSpPr>
-        <p:spPr>
-          <a:xfrm>
-            <a:off x="4497976" y="3331028"/>
-            <a:ext cx="0" cy="240491"/>
-          </a:xfrm>
-          <a:prstGeom prst="line">
-            <a:avLst/>
-          </a:prstGeom>
-          <a:ln w="19050">
-            <a:solidFill>
-              <a:schemeClr val="tx1">
-                <a:lumMod val="75000"/>
-                <a:lumOff val="25000"/>
-              </a:schemeClr>
-            </a:solidFill>
-          </a:ln>
-        </p:spPr>
-        <p:style>
-          <a:lnRef idx="1">
-            <a:schemeClr val="accent1"/>
-          </a:lnRef>
-          <a:fillRef idx="0">
-            <a:schemeClr val="accent1"/>
-          </a:fillRef>
-          <a:effectRef idx="0">
-            <a:schemeClr val="accent1"/>
-          </a:effectRef>
-          <a:fontRef idx="minor">
-            <a:schemeClr val="tx1"/>
-          </a:fontRef>
-        </p:style>
-      </p:cxnSp>
-      <p:sp>
-        <p:nvSpPr>
-          <p:cNvPr id="40" name="テキスト ボックス 39"/>
-          <p:cNvSpPr txBox="1"/>
-          <p:nvPr/>
-        </p:nvSpPr>
-        <p:spPr>
-          <a:xfrm>
-            <a:off x="4481563" y="3426599"/>
-            <a:ext cx="2982351" cy="369332"/>
-          </a:xfrm>
-          <a:prstGeom prst="rect">
-            <a:avLst/>
-          </a:prstGeom>
-          <a:noFill/>
-        </p:spPr>
-        <p:txBody>
-          <a:bodyPr wrap="square" rtlCol="0">
-            <a:spAutoFit/>
-          </a:bodyPr>
-          <a:lstStyle/>
-          <a:p>
-            <a:r>
-              <a:rPr kumimoji="1" lang="en-US" altLang="ja-JP" dirty="0" smtClean="0"/>
-              <a:t>(</a:t>
-            </a:r>
-            <a:r>
-              <a:rPr lang="en-US" altLang="ja-JP" dirty="0"/>
-              <a:t>w</a:t>
-            </a:r>
-            <a:r>
-              <a:rPr kumimoji="1" lang="en-US" altLang="ja-JP" dirty="0" smtClean="0"/>
-              <a:t>)</a:t>
-            </a:r>
-            <a:endParaRPr kumimoji="1" lang="ja-JP" altLang="en-US" dirty="0"/>
-          </a:p>
-        </p:txBody>
-      </p:sp>
-      <p:cxnSp>
-        <p:nvCxnSpPr>
-          <p:cNvPr id="41" name="直線コネクタ 40"/>
-          <p:cNvCxnSpPr/>
-          <p:nvPr/>
-        </p:nvCxnSpPr>
-        <p:spPr>
-          <a:xfrm>
-            <a:off x="5484082" y="2583654"/>
-            <a:ext cx="0" cy="1685891"/>
-          </a:xfrm>
-          <a:prstGeom prst="line">
-            <a:avLst/>
-          </a:prstGeom>
-          <a:ln w="19050">
-            <a:solidFill>
-              <a:schemeClr val="tx1">
-                <a:lumMod val="75000"/>
-                <a:lumOff val="25000"/>
-              </a:schemeClr>
-            </a:solidFill>
-          </a:ln>
-        </p:spPr>
-        <p:style>
-          <a:lnRef idx="1">
-            <a:schemeClr val="accent1"/>
-          </a:lnRef>
-          <a:fillRef idx="0">
-            <a:schemeClr val="accent1"/>
-          </a:fillRef>
-          <a:effectRef idx="0">
-            <a:schemeClr val="accent1"/>
-          </a:effectRef>
-          <a:fontRef idx="minor">
-            <a:schemeClr val="tx1"/>
-          </a:fontRef>
-        </p:style>
-      </p:cxnSp>
-      <p:cxnSp>
-        <p:nvCxnSpPr>
-          <p:cNvPr id="43" name="直線コネクタ 42"/>
-          <p:cNvCxnSpPr/>
-          <p:nvPr/>
-        </p:nvCxnSpPr>
-        <p:spPr>
-          <a:xfrm rot="5400000">
-            <a:off x="5484081" y="2468210"/>
-            <a:ext cx="0" cy="240491"/>
-          </a:xfrm>
-          <a:prstGeom prst="line">
-            <a:avLst/>
-          </a:prstGeom>
-          <a:ln w="19050">
-            <a:solidFill>
-              <a:schemeClr val="tx1">
-                <a:lumMod val="75000"/>
-                <a:lumOff val="25000"/>
-              </a:schemeClr>
-            </a:solidFill>
-          </a:ln>
-        </p:spPr>
-        <p:style>
-          <a:lnRef idx="1">
-            <a:schemeClr val="accent1"/>
-          </a:lnRef>
-          <a:fillRef idx="0">
-            <a:schemeClr val="accent1"/>
-          </a:fillRef>
-          <a:effectRef idx="0">
-            <a:schemeClr val="accent1"/>
-          </a:effectRef>
-          <a:fontRef idx="minor">
-            <a:schemeClr val="tx1"/>
-          </a:fontRef>
-        </p:style>
-      </p:cxnSp>
-      <p:cxnSp>
-        <p:nvCxnSpPr>
-          <p:cNvPr id="44" name="直線コネクタ 43"/>
-          <p:cNvCxnSpPr/>
-          <p:nvPr/>
-        </p:nvCxnSpPr>
-        <p:spPr>
-          <a:xfrm rot="5400000">
-            <a:off x="5484080" y="4137462"/>
-            <a:ext cx="0" cy="240491"/>
-          </a:xfrm>
-          <a:prstGeom prst="line">
-            <a:avLst/>
-          </a:prstGeom>
-          <a:ln w="19050">
-            <a:solidFill>
-              <a:schemeClr val="tx1">
-                <a:lumMod val="75000"/>
-                <a:lumOff val="25000"/>
-              </a:schemeClr>
-            </a:solidFill>
-          </a:ln>
-        </p:spPr>
-        <p:style>
-          <a:lnRef idx="1">
-            <a:schemeClr val="accent1"/>
-          </a:lnRef>
-          <a:fillRef idx="0">
-            <a:schemeClr val="accent1"/>
-          </a:fillRef>
-          <a:effectRef idx="0">
-            <a:schemeClr val="accent1"/>
-          </a:effectRef>
-          <a:fontRef idx="minor">
-            <a:schemeClr val="tx1"/>
-          </a:fontRef>
-        </p:style>
-      </p:cxnSp>
-      <p:sp>
-        <p:nvSpPr>
-          <p:cNvPr id="45" name="テキスト ボックス 44"/>
-          <p:cNvSpPr txBox="1"/>
-          <p:nvPr/>
-        </p:nvSpPr>
-        <p:spPr>
-          <a:xfrm>
-            <a:off x="5459964" y="2561281"/>
-            <a:ext cx="2982351" cy="369332"/>
-          </a:xfrm>
-          <a:prstGeom prst="rect">
-            <a:avLst/>
-          </a:prstGeom>
-          <a:noFill/>
-        </p:spPr>
-        <p:txBody>
-          <a:bodyPr wrap="square" rtlCol="0">
-            <a:spAutoFit/>
-          </a:bodyPr>
-          <a:lstStyle/>
-          <a:p>
-            <a:r>
-              <a:rPr kumimoji="1" lang="en-US" altLang="ja-JP" dirty="0" smtClean="0"/>
-              <a:t>(</a:t>
-            </a:r>
-            <a:r>
-              <a:rPr lang="en-US" altLang="ja-JP" dirty="0"/>
-              <a:t>h</a:t>
-            </a:r>
-            <a:r>
-              <a:rPr kumimoji="1" lang="en-US" altLang="ja-JP" dirty="0" smtClean="0"/>
-              <a:t>)</a:t>
-            </a:r>
-            <a:endParaRPr kumimoji="1" lang="ja-JP" altLang="en-US" dirty="0"/>
-          </a:p>
-        </p:txBody>
-      </p:sp>
+        </p:grpSpPr>
+        <p:pic>
+          <p:nvPicPr>
+            <p:cNvPr id="5" name="図 4"/>
+            <p:cNvPicPr>
+              <a:picLocks noChangeAspect="1"/>
+            </p:cNvPicPr>
+            <p:nvPr/>
+          </p:nvPicPr>
+          <p:blipFill rotWithShape="1">
+            <a:blip r:embed="rId2">
+              <a:extLst>
+                <a:ext uri="{28A0092B-C50C-407E-A947-70E740481C1C}">
+                  <a14:useLocalDpi xmlns:a14="http://schemas.microsoft.com/office/drawing/2010/main" val="0"/>
+                </a:ext>
+              </a:extLst>
+            </a:blip>
+            <a:srcRect l="5792" t="11480" r="5423" b="15634"/>
+            <a:stretch/>
+          </p:blipFill>
+          <p:spPr>
+            <a:xfrm>
+              <a:off x="3810001" y="1485899"/>
+              <a:ext cx="4591050" cy="3676651"/>
+            </a:xfrm>
+            <a:prstGeom prst="rect">
+              <a:avLst/>
+            </a:prstGeom>
+          </p:spPr>
+        </p:pic>
+        <p:cxnSp>
+          <p:nvCxnSpPr>
+            <p:cNvPr id="10" name="直線コネクタ 9"/>
+            <p:cNvCxnSpPr/>
+            <p:nvPr/>
+          </p:nvCxnSpPr>
+          <p:spPr>
+            <a:xfrm>
+              <a:off x="3846173" y="2463409"/>
+              <a:ext cx="0" cy="240491"/>
+            </a:xfrm>
+            <a:prstGeom prst="line">
+              <a:avLst/>
+            </a:prstGeom>
+            <a:ln w="19050">
+              <a:solidFill>
+                <a:schemeClr val="tx1">
+                  <a:lumMod val="75000"/>
+                  <a:lumOff val="25000"/>
+                </a:schemeClr>
+              </a:solidFill>
+            </a:ln>
+          </p:spPr>
+          <p:style>
+            <a:lnRef idx="1">
+              <a:schemeClr val="accent1"/>
+            </a:lnRef>
+            <a:fillRef idx="0">
+              <a:schemeClr val="accent1"/>
+            </a:fillRef>
+            <a:effectRef idx="0">
+              <a:schemeClr val="accent1"/>
+            </a:effectRef>
+            <a:fontRef idx="minor">
+              <a:schemeClr val="tx1"/>
+            </a:fontRef>
+          </p:style>
+        </p:cxnSp>
+        <p:sp>
+          <p:nvSpPr>
+            <p:cNvPr id="15" name="テキスト ボックス 14"/>
+            <p:cNvSpPr txBox="1"/>
+            <p:nvPr/>
+          </p:nvSpPr>
+          <p:spPr>
+            <a:xfrm>
+              <a:off x="3846173" y="2243798"/>
+              <a:ext cx="2982351" cy="369332"/>
+            </a:xfrm>
+            <a:prstGeom prst="rect">
+              <a:avLst/>
+            </a:prstGeom>
+            <a:noFill/>
+          </p:spPr>
+          <p:txBody>
+            <a:bodyPr wrap="square" rtlCol="0">
+              <a:spAutoFit/>
+            </a:bodyPr>
+            <a:lstStyle/>
+            <a:p>
+              <a:r>
+                <a:rPr kumimoji="1" lang="en-US" altLang="ja-JP" dirty="0" smtClean="0"/>
+                <a:t>(</a:t>
+              </a:r>
+              <a:r>
+                <a:rPr lang="en-US" altLang="ja-JP" dirty="0"/>
+                <a:t>x</a:t>
+              </a:r>
+              <a:r>
+                <a:rPr kumimoji="1" lang="en-US" altLang="ja-JP" dirty="0" smtClean="0"/>
+                <a:t>)</a:t>
+              </a:r>
+              <a:endParaRPr kumimoji="1" lang="ja-JP" altLang="en-US" dirty="0"/>
+            </a:p>
+          </p:txBody>
+        </p:sp>
+        <p:cxnSp>
+          <p:nvCxnSpPr>
+            <p:cNvPr id="14" name="直線コネクタ 13"/>
+            <p:cNvCxnSpPr/>
+            <p:nvPr/>
+          </p:nvCxnSpPr>
+          <p:spPr>
+            <a:xfrm>
+              <a:off x="3846173" y="2577598"/>
+              <a:ext cx="635391" cy="0"/>
+            </a:xfrm>
+            <a:prstGeom prst="line">
+              <a:avLst/>
+            </a:prstGeom>
+            <a:ln w="19050">
+              <a:solidFill>
+                <a:schemeClr val="tx1">
+                  <a:lumMod val="75000"/>
+                  <a:lumOff val="25000"/>
+                </a:schemeClr>
+              </a:solidFill>
+            </a:ln>
+          </p:spPr>
+          <p:style>
+            <a:lnRef idx="1">
+              <a:schemeClr val="accent1"/>
+            </a:lnRef>
+            <a:fillRef idx="0">
+              <a:schemeClr val="accent1"/>
+            </a:fillRef>
+            <a:effectRef idx="0">
+              <a:schemeClr val="accent1"/>
+            </a:effectRef>
+            <a:fontRef idx="minor">
+              <a:schemeClr val="tx1"/>
+            </a:fontRef>
+          </p:style>
+        </p:cxnSp>
+        <p:cxnSp>
+          <p:nvCxnSpPr>
+            <p:cNvPr id="20" name="直線コネクタ 19"/>
+            <p:cNvCxnSpPr/>
+            <p:nvPr/>
+          </p:nvCxnSpPr>
+          <p:spPr>
+            <a:xfrm rot="5400000">
+              <a:off x="4485080" y="1624152"/>
+              <a:ext cx="0" cy="240491"/>
+            </a:xfrm>
+            <a:prstGeom prst="line">
+              <a:avLst/>
+            </a:prstGeom>
+            <a:ln w="19050">
+              <a:solidFill>
+                <a:schemeClr val="tx1">
+                  <a:lumMod val="75000"/>
+                  <a:lumOff val="25000"/>
+                </a:schemeClr>
+              </a:solidFill>
+            </a:ln>
+          </p:spPr>
+          <p:style>
+            <a:lnRef idx="1">
+              <a:schemeClr val="accent1"/>
+            </a:lnRef>
+            <a:fillRef idx="0">
+              <a:schemeClr val="accent1"/>
+            </a:fillRef>
+            <a:effectRef idx="0">
+              <a:schemeClr val="accent1"/>
+            </a:effectRef>
+            <a:fontRef idx="minor">
+              <a:schemeClr val="tx1"/>
+            </a:fontRef>
+          </p:style>
+        </p:cxnSp>
+        <p:cxnSp>
+          <p:nvCxnSpPr>
+            <p:cNvPr id="22" name="直線コネクタ 21"/>
+            <p:cNvCxnSpPr/>
+            <p:nvPr/>
+          </p:nvCxnSpPr>
+          <p:spPr>
+            <a:xfrm>
+              <a:off x="4485081" y="1744397"/>
+              <a:ext cx="0" cy="844058"/>
+            </a:xfrm>
+            <a:prstGeom prst="line">
+              <a:avLst/>
+            </a:prstGeom>
+            <a:ln w="19050">
+              <a:solidFill>
+                <a:schemeClr val="tx1">
+                  <a:lumMod val="75000"/>
+                  <a:lumOff val="25000"/>
+                </a:schemeClr>
+              </a:solidFill>
+            </a:ln>
+          </p:spPr>
+          <p:style>
+            <a:lnRef idx="1">
+              <a:schemeClr val="accent1"/>
+            </a:lnRef>
+            <a:fillRef idx="0">
+              <a:schemeClr val="accent1"/>
+            </a:fillRef>
+            <a:effectRef idx="0">
+              <a:schemeClr val="accent1"/>
+            </a:effectRef>
+            <a:fontRef idx="minor">
+              <a:schemeClr val="tx1"/>
+            </a:fontRef>
+          </p:style>
+        </p:cxnSp>
+        <p:sp>
+          <p:nvSpPr>
+            <p:cNvPr id="33" name="テキスト ボックス 32"/>
+            <p:cNvSpPr txBox="1"/>
+            <p:nvPr/>
+          </p:nvSpPr>
+          <p:spPr>
+            <a:xfrm>
+              <a:off x="4481563" y="1756793"/>
+              <a:ext cx="2982351" cy="369332"/>
+            </a:xfrm>
+            <a:prstGeom prst="rect">
+              <a:avLst/>
+            </a:prstGeom>
+            <a:noFill/>
+          </p:spPr>
+          <p:txBody>
+            <a:bodyPr wrap="square" rtlCol="0">
+              <a:spAutoFit/>
+            </a:bodyPr>
+            <a:lstStyle/>
+            <a:p>
+              <a:r>
+                <a:rPr kumimoji="1" lang="en-US" altLang="ja-JP" dirty="0" smtClean="0"/>
+                <a:t>(</a:t>
+              </a:r>
+              <a:r>
+                <a:rPr lang="en-US" altLang="ja-JP" dirty="0"/>
+                <a:t>y</a:t>
+              </a:r>
+              <a:r>
+                <a:rPr kumimoji="1" lang="en-US" altLang="ja-JP" dirty="0" smtClean="0"/>
+                <a:t>)</a:t>
+              </a:r>
+              <a:endParaRPr kumimoji="1" lang="ja-JP" altLang="en-US" dirty="0"/>
+            </a:p>
+          </p:txBody>
+        </p:sp>
+        <p:cxnSp>
+          <p:nvCxnSpPr>
+            <p:cNvPr id="35" name="直線コネクタ 34"/>
+            <p:cNvCxnSpPr/>
+            <p:nvPr/>
+          </p:nvCxnSpPr>
+          <p:spPr>
+            <a:xfrm>
+              <a:off x="4481564" y="3451274"/>
+              <a:ext cx="1968473" cy="0"/>
+            </a:xfrm>
+            <a:prstGeom prst="line">
+              <a:avLst/>
+            </a:prstGeom>
+            <a:ln w="19050">
+              <a:solidFill>
+                <a:schemeClr val="tx1">
+                  <a:lumMod val="75000"/>
+                  <a:lumOff val="25000"/>
+                </a:schemeClr>
+              </a:solidFill>
+            </a:ln>
+          </p:spPr>
+          <p:style>
+            <a:lnRef idx="1">
+              <a:schemeClr val="accent1"/>
+            </a:lnRef>
+            <a:fillRef idx="0">
+              <a:schemeClr val="accent1"/>
+            </a:fillRef>
+            <a:effectRef idx="0">
+              <a:schemeClr val="accent1"/>
+            </a:effectRef>
+            <a:fontRef idx="minor">
+              <a:schemeClr val="tx1"/>
+            </a:fontRef>
+          </p:style>
+        </p:cxnSp>
+        <p:cxnSp>
+          <p:nvCxnSpPr>
+            <p:cNvPr id="36" name="直線コネクタ 35"/>
+            <p:cNvCxnSpPr/>
+            <p:nvPr/>
+          </p:nvCxnSpPr>
+          <p:spPr>
+            <a:xfrm>
+              <a:off x="6450037" y="3331028"/>
+              <a:ext cx="0" cy="240491"/>
+            </a:xfrm>
+            <a:prstGeom prst="line">
+              <a:avLst/>
+            </a:prstGeom>
+            <a:ln w="19050">
+              <a:solidFill>
+                <a:schemeClr val="tx1">
+                  <a:lumMod val="75000"/>
+                  <a:lumOff val="25000"/>
+                </a:schemeClr>
+              </a:solidFill>
+            </a:ln>
+          </p:spPr>
+          <p:style>
+            <a:lnRef idx="1">
+              <a:schemeClr val="accent1"/>
+            </a:lnRef>
+            <a:fillRef idx="0">
+              <a:schemeClr val="accent1"/>
+            </a:fillRef>
+            <a:effectRef idx="0">
+              <a:schemeClr val="accent1"/>
+            </a:effectRef>
+            <a:fontRef idx="minor">
+              <a:schemeClr val="tx1"/>
+            </a:fontRef>
+          </p:style>
+        </p:cxnSp>
+        <p:cxnSp>
+          <p:nvCxnSpPr>
+            <p:cNvPr id="37" name="直線コネクタ 36"/>
+            <p:cNvCxnSpPr/>
+            <p:nvPr/>
+          </p:nvCxnSpPr>
+          <p:spPr>
+            <a:xfrm>
+              <a:off x="4497976" y="3331028"/>
+              <a:ext cx="0" cy="240491"/>
+            </a:xfrm>
+            <a:prstGeom prst="line">
+              <a:avLst/>
+            </a:prstGeom>
+            <a:ln w="19050">
+              <a:solidFill>
+                <a:schemeClr val="tx1">
+                  <a:lumMod val="75000"/>
+                  <a:lumOff val="25000"/>
+                </a:schemeClr>
+              </a:solidFill>
+            </a:ln>
+          </p:spPr>
+          <p:style>
+            <a:lnRef idx="1">
+              <a:schemeClr val="accent1"/>
+            </a:lnRef>
+            <a:fillRef idx="0">
+              <a:schemeClr val="accent1"/>
+            </a:fillRef>
+            <a:effectRef idx="0">
+              <a:schemeClr val="accent1"/>
+            </a:effectRef>
+            <a:fontRef idx="minor">
+              <a:schemeClr val="tx1"/>
+            </a:fontRef>
+          </p:style>
+        </p:cxnSp>
+        <p:sp>
+          <p:nvSpPr>
+            <p:cNvPr id="40" name="テキスト ボックス 39"/>
+            <p:cNvSpPr txBox="1"/>
+            <p:nvPr/>
+          </p:nvSpPr>
+          <p:spPr>
+            <a:xfrm>
+              <a:off x="4481563" y="3426599"/>
+              <a:ext cx="2982351" cy="369332"/>
+            </a:xfrm>
+            <a:prstGeom prst="rect">
+              <a:avLst/>
+            </a:prstGeom>
+            <a:noFill/>
+          </p:spPr>
+          <p:txBody>
+            <a:bodyPr wrap="square" rtlCol="0">
+              <a:spAutoFit/>
+            </a:bodyPr>
+            <a:lstStyle/>
+            <a:p>
+              <a:r>
+                <a:rPr kumimoji="1" lang="en-US" altLang="ja-JP" dirty="0" smtClean="0"/>
+                <a:t>(</a:t>
+              </a:r>
+              <a:r>
+                <a:rPr lang="en-US" altLang="ja-JP" dirty="0"/>
+                <a:t>w</a:t>
+              </a:r>
+              <a:r>
+                <a:rPr kumimoji="1" lang="en-US" altLang="ja-JP" dirty="0" smtClean="0"/>
+                <a:t>)</a:t>
+              </a:r>
+              <a:endParaRPr kumimoji="1" lang="ja-JP" altLang="en-US" dirty="0"/>
+            </a:p>
+          </p:txBody>
+        </p:sp>
+        <p:cxnSp>
+          <p:nvCxnSpPr>
+            <p:cNvPr id="41" name="直線コネクタ 40"/>
+            <p:cNvCxnSpPr/>
+            <p:nvPr/>
+          </p:nvCxnSpPr>
+          <p:spPr>
+            <a:xfrm>
+              <a:off x="5484082" y="2583654"/>
+              <a:ext cx="0" cy="1685891"/>
+            </a:xfrm>
+            <a:prstGeom prst="line">
+              <a:avLst/>
+            </a:prstGeom>
+            <a:ln w="19050">
+              <a:solidFill>
+                <a:schemeClr val="tx1">
+                  <a:lumMod val="75000"/>
+                  <a:lumOff val="25000"/>
+                </a:schemeClr>
+              </a:solidFill>
+            </a:ln>
+          </p:spPr>
+          <p:style>
+            <a:lnRef idx="1">
+              <a:schemeClr val="accent1"/>
+            </a:lnRef>
+            <a:fillRef idx="0">
+              <a:schemeClr val="accent1"/>
+            </a:fillRef>
+            <a:effectRef idx="0">
+              <a:schemeClr val="accent1"/>
+            </a:effectRef>
+            <a:fontRef idx="minor">
+              <a:schemeClr val="tx1"/>
+            </a:fontRef>
+          </p:style>
+        </p:cxnSp>
+        <p:cxnSp>
+          <p:nvCxnSpPr>
+            <p:cNvPr id="43" name="直線コネクタ 42"/>
+            <p:cNvCxnSpPr/>
+            <p:nvPr/>
+          </p:nvCxnSpPr>
+          <p:spPr>
+            <a:xfrm rot="5400000">
+              <a:off x="5484081" y="2468210"/>
+              <a:ext cx="0" cy="240491"/>
+            </a:xfrm>
+            <a:prstGeom prst="line">
+              <a:avLst/>
+            </a:prstGeom>
+            <a:ln w="19050">
+              <a:solidFill>
+                <a:schemeClr val="tx1">
+                  <a:lumMod val="75000"/>
+                  <a:lumOff val="25000"/>
+                </a:schemeClr>
+              </a:solidFill>
+            </a:ln>
+          </p:spPr>
+          <p:style>
+            <a:lnRef idx="1">
+              <a:schemeClr val="accent1"/>
+            </a:lnRef>
+            <a:fillRef idx="0">
+              <a:schemeClr val="accent1"/>
+            </a:fillRef>
+            <a:effectRef idx="0">
+              <a:schemeClr val="accent1"/>
+            </a:effectRef>
+            <a:fontRef idx="minor">
+              <a:schemeClr val="tx1"/>
+            </a:fontRef>
+          </p:style>
+        </p:cxnSp>
+        <p:cxnSp>
+          <p:nvCxnSpPr>
+            <p:cNvPr id="44" name="直線コネクタ 43"/>
+            <p:cNvCxnSpPr/>
+            <p:nvPr/>
+          </p:nvCxnSpPr>
+          <p:spPr>
+            <a:xfrm rot="5400000">
+              <a:off x="5484080" y="4137462"/>
+              <a:ext cx="0" cy="240491"/>
+            </a:xfrm>
+            <a:prstGeom prst="line">
+              <a:avLst/>
+            </a:prstGeom>
+            <a:ln w="19050">
+              <a:solidFill>
+                <a:schemeClr val="tx1">
+                  <a:lumMod val="75000"/>
+                  <a:lumOff val="25000"/>
+                </a:schemeClr>
+              </a:solidFill>
+            </a:ln>
+          </p:spPr>
+          <p:style>
+            <a:lnRef idx="1">
+              <a:schemeClr val="accent1"/>
+            </a:lnRef>
+            <a:fillRef idx="0">
+              <a:schemeClr val="accent1"/>
+            </a:fillRef>
+            <a:effectRef idx="0">
+              <a:schemeClr val="accent1"/>
+            </a:effectRef>
+            <a:fontRef idx="minor">
+              <a:schemeClr val="tx1"/>
+            </a:fontRef>
+          </p:style>
+        </p:cxnSp>
+        <p:sp>
+          <p:nvSpPr>
+            <p:cNvPr id="45" name="テキスト ボックス 44"/>
+            <p:cNvSpPr txBox="1"/>
+            <p:nvPr/>
+          </p:nvSpPr>
+          <p:spPr>
+            <a:xfrm>
+              <a:off x="5459964" y="2561281"/>
+              <a:ext cx="2982351" cy="369332"/>
+            </a:xfrm>
+            <a:prstGeom prst="rect">
+              <a:avLst/>
+            </a:prstGeom>
+            <a:noFill/>
+          </p:spPr>
+          <p:txBody>
+            <a:bodyPr wrap="square" rtlCol="0">
+              <a:spAutoFit/>
+            </a:bodyPr>
+            <a:lstStyle/>
+            <a:p>
+              <a:r>
+                <a:rPr kumimoji="1" lang="en-US" altLang="ja-JP" dirty="0" smtClean="0"/>
+                <a:t>(</a:t>
+              </a:r>
+              <a:r>
+                <a:rPr lang="en-US" altLang="ja-JP" dirty="0"/>
+                <a:t>h</a:t>
+              </a:r>
+              <a:r>
+                <a:rPr kumimoji="1" lang="en-US" altLang="ja-JP" dirty="0" smtClean="0"/>
+                <a:t>)</a:t>
+              </a:r>
+              <a:endParaRPr kumimoji="1" lang="ja-JP" altLang="en-US" dirty="0"/>
+            </a:p>
+          </p:txBody>
+        </p:sp>
+      </p:grpSp>
     </p:spTree>
     <p:extLst>
       <p:ext uri="{BB962C8B-B14F-4D97-AF65-F5344CB8AC3E}">

</xml_diff>

<commit_message>
Delete the unwanted line
</commit_message>
<xml_diff>
--- a/01/img/origin/image_of_the_function_to_draw_shapes.pptx
+++ b/01/img/origin/image_of_the_function_to_draw_shapes.pptx
@@ -253,7 +253,7 @@
           <a:p>
             <a:fld id="{99457851-FC96-4ECE-805F-5E2052AA7784}" type="datetimeFigureOut">
               <a:rPr kumimoji="1" lang="ja-JP" altLang="en-US" smtClean="0"/>
-              <a:t>2016/4/5</a:t>
+              <a:t>2016/4/13</a:t>
             </a:fld>
             <a:endParaRPr kumimoji="1" lang="ja-JP" altLang="en-US"/>
           </a:p>
@@ -455,7 +455,7 @@
           <a:p>
             <a:fld id="{99457851-FC96-4ECE-805F-5E2052AA7784}" type="datetimeFigureOut">
               <a:rPr kumimoji="1" lang="ja-JP" altLang="en-US" smtClean="0"/>
-              <a:t>2016/4/5</a:t>
+              <a:t>2016/4/13</a:t>
             </a:fld>
             <a:endParaRPr kumimoji="1" lang="ja-JP" altLang="en-US"/>
           </a:p>
@@ -667,7 +667,7 @@
           <a:p>
             <a:fld id="{99457851-FC96-4ECE-805F-5E2052AA7784}" type="datetimeFigureOut">
               <a:rPr kumimoji="1" lang="ja-JP" altLang="en-US" smtClean="0"/>
-              <a:t>2016/4/5</a:t>
+              <a:t>2016/4/13</a:t>
             </a:fld>
             <a:endParaRPr kumimoji="1" lang="ja-JP" altLang="en-US"/>
           </a:p>
@@ -869,7 +869,7 @@
           <a:p>
             <a:fld id="{99457851-FC96-4ECE-805F-5E2052AA7784}" type="datetimeFigureOut">
               <a:rPr kumimoji="1" lang="ja-JP" altLang="en-US" smtClean="0"/>
-              <a:t>2016/4/5</a:t>
+              <a:t>2016/4/13</a:t>
             </a:fld>
             <a:endParaRPr kumimoji="1" lang="ja-JP" altLang="en-US"/>
           </a:p>
@@ -1115,7 +1115,7 @@
           <a:p>
             <a:fld id="{99457851-FC96-4ECE-805F-5E2052AA7784}" type="datetimeFigureOut">
               <a:rPr kumimoji="1" lang="ja-JP" altLang="en-US" smtClean="0"/>
-              <a:t>2016/4/5</a:t>
+              <a:t>2016/4/13</a:t>
             </a:fld>
             <a:endParaRPr kumimoji="1" lang="ja-JP" altLang="en-US"/>
           </a:p>
@@ -1411,7 +1411,7 @@
           <a:p>
             <a:fld id="{99457851-FC96-4ECE-805F-5E2052AA7784}" type="datetimeFigureOut">
               <a:rPr kumimoji="1" lang="ja-JP" altLang="en-US" smtClean="0"/>
-              <a:t>2016/4/5</a:t>
+              <a:t>2016/4/13</a:t>
             </a:fld>
             <a:endParaRPr kumimoji="1" lang="ja-JP" altLang="en-US"/>
           </a:p>
@@ -1842,7 +1842,7 @@
           <a:p>
             <a:fld id="{99457851-FC96-4ECE-805F-5E2052AA7784}" type="datetimeFigureOut">
               <a:rPr kumimoji="1" lang="ja-JP" altLang="en-US" smtClean="0"/>
-              <a:t>2016/4/5</a:t>
+              <a:t>2016/4/13</a:t>
             </a:fld>
             <a:endParaRPr kumimoji="1" lang="ja-JP" altLang="en-US"/>
           </a:p>
@@ -1960,7 +1960,7 @@
           <a:p>
             <a:fld id="{99457851-FC96-4ECE-805F-5E2052AA7784}" type="datetimeFigureOut">
               <a:rPr kumimoji="1" lang="ja-JP" altLang="en-US" smtClean="0"/>
-              <a:t>2016/4/5</a:t>
+              <a:t>2016/4/13</a:t>
             </a:fld>
             <a:endParaRPr kumimoji="1" lang="ja-JP" altLang="en-US"/>
           </a:p>
@@ -2055,7 +2055,7 @@
           <a:p>
             <a:fld id="{99457851-FC96-4ECE-805F-5E2052AA7784}" type="datetimeFigureOut">
               <a:rPr kumimoji="1" lang="ja-JP" altLang="en-US" smtClean="0"/>
-              <a:t>2016/4/5</a:t>
+              <a:t>2016/4/13</a:t>
             </a:fld>
             <a:endParaRPr kumimoji="1" lang="ja-JP" altLang="en-US"/>
           </a:p>
@@ -2364,7 +2364,7 @@
           <a:p>
             <a:fld id="{99457851-FC96-4ECE-805F-5E2052AA7784}" type="datetimeFigureOut">
               <a:rPr kumimoji="1" lang="ja-JP" altLang="en-US" smtClean="0"/>
-              <a:t>2016/4/5</a:t>
+              <a:t>2016/4/13</a:t>
             </a:fld>
             <a:endParaRPr kumimoji="1" lang="ja-JP" altLang="en-US"/>
           </a:p>
@@ -2617,7 +2617,7 @@
           <a:p>
             <a:fld id="{99457851-FC96-4ECE-805F-5E2052AA7784}" type="datetimeFigureOut">
               <a:rPr kumimoji="1" lang="ja-JP" altLang="en-US" smtClean="0"/>
-              <a:t>2016/4/5</a:t>
+              <a:t>2016/4/13</a:t>
             </a:fld>
             <a:endParaRPr kumimoji="1" lang="ja-JP" altLang="en-US"/>
           </a:p>
@@ -2862,7 +2862,7 @@
           <a:p>
             <a:fld id="{99457851-FC96-4ECE-805F-5E2052AA7784}" type="datetimeFigureOut">
               <a:rPr kumimoji="1" lang="ja-JP" altLang="en-US" smtClean="0"/>
-              <a:t>2016/4/5</a:t>
+              <a:t>2016/4/13</a:t>
             </a:fld>
             <a:endParaRPr kumimoji="1" lang="ja-JP" altLang="en-US"/>
           </a:p>
@@ -4490,82 +4490,6 @@
           </a:prstGeom>
         </p:spPr>
       </p:pic>
-      <p:cxnSp>
-        <p:nvCxnSpPr>
-          <p:cNvPr id="10" name="直線コネクタ 9"/>
-          <p:cNvCxnSpPr/>
-          <p:nvPr/>
-        </p:nvCxnSpPr>
-        <p:spPr>
-          <a:xfrm>
-            <a:off x="2750798" y="2767744"/>
-            <a:ext cx="0" cy="240491"/>
-          </a:xfrm>
-          <a:prstGeom prst="line">
-            <a:avLst/>
-          </a:prstGeom>
-          <a:ln w="19050">
-            <a:solidFill>
-              <a:schemeClr val="tx1">
-                <a:lumMod val="75000"/>
-                <a:lumOff val="25000"/>
-              </a:schemeClr>
-            </a:solidFill>
-          </a:ln>
-        </p:spPr>
-        <p:style>
-          <a:lnRef idx="1">
-            <a:schemeClr val="accent1"/>
-          </a:lnRef>
-          <a:fillRef idx="0">
-            <a:schemeClr val="accent1"/>
-          </a:fillRef>
-          <a:effectRef idx="0">
-            <a:schemeClr val="accent1"/>
-          </a:effectRef>
-          <a:fontRef idx="minor">
-            <a:schemeClr val="tx1"/>
-          </a:fontRef>
-        </p:style>
-      </p:cxnSp>
-      <p:cxnSp>
-        <p:nvCxnSpPr>
-          <p:cNvPr id="14" name="直線コネクタ 13"/>
-          <p:cNvCxnSpPr/>
-          <p:nvPr/>
-        </p:nvCxnSpPr>
-        <p:spPr>
-          <a:xfrm>
-            <a:off x="2750798" y="2887989"/>
-            <a:ext cx="635391" cy="0"/>
-          </a:xfrm>
-          <a:prstGeom prst="line">
-            <a:avLst/>
-          </a:prstGeom>
-          <a:ln w="19050">
-            <a:solidFill>
-              <a:schemeClr val="tx1">
-                <a:lumMod val="75000"/>
-                <a:lumOff val="25000"/>
-              </a:schemeClr>
-            </a:solidFill>
-          </a:ln>
-        </p:spPr>
-        <p:style>
-          <a:lnRef idx="1">
-            <a:schemeClr val="accent1"/>
-          </a:lnRef>
-          <a:fillRef idx="0">
-            <a:schemeClr val="accent1"/>
-          </a:fillRef>
-          <a:effectRef idx="0">
-            <a:schemeClr val="accent1"/>
-          </a:effectRef>
-          <a:fontRef idx="minor">
-            <a:schemeClr val="tx1"/>
-          </a:fontRef>
-        </p:style>
-      </p:cxnSp>
       <p:sp>
         <p:nvSpPr>
           <p:cNvPr id="15" name="テキスト ボックス 14"/>
@@ -4680,44 +4604,6 @@
           </a:fontRef>
         </p:style>
       </p:cxnSp>
-      <p:sp>
-        <p:nvSpPr>
-          <p:cNvPr id="33" name="テキスト ボックス 32"/>
-          <p:cNvSpPr txBox="1"/>
-          <p:nvPr/>
-        </p:nvSpPr>
-        <p:spPr>
-          <a:xfrm>
-            <a:off x="7339063" y="1560080"/>
-            <a:ext cx="2982351" cy="369332"/>
-          </a:xfrm>
-          <a:prstGeom prst="rect">
-            <a:avLst/>
-          </a:prstGeom>
-          <a:noFill/>
-        </p:spPr>
-        <p:txBody>
-          <a:bodyPr wrap="square" rtlCol="0">
-            <a:spAutoFit/>
-          </a:bodyPr>
-          <a:lstStyle/>
-          <a:p>
-            <a:r>
-              <a:rPr kumimoji="1" lang="en-US" altLang="ja-JP" dirty="0" smtClean="0"/>
-              <a:t>(</a:t>
-            </a:r>
-            <a:r>
-              <a:rPr lang="en-US" altLang="ja-JP" dirty="0"/>
-              <a:t>y</a:t>
-            </a:r>
-            <a:r>
-              <a:rPr kumimoji="1" lang="en-US" altLang="ja-JP" dirty="0" smtClean="0"/>
-              <a:t>)</a:t>
-            </a:r>
-            <a:endParaRPr kumimoji="1" lang="ja-JP" altLang="en-US" dirty="0"/>
-          </a:p>
-        </p:txBody>
-      </p:sp>
       <p:cxnSp>
         <p:nvCxnSpPr>
           <p:cNvPr id="35" name="直線コネクタ 34"/>
@@ -4728,44 +4614,6 @@
           <a:xfrm>
             <a:off x="4111528" y="3098848"/>
             <a:ext cx="1415396" cy="1"/>
-          </a:xfrm>
-          <a:prstGeom prst="line">
-            <a:avLst/>
-          </a:prstGeom>
-          <a:ln w="19050">
-            <a:solidFill>
-              <a:schemeClr val="tx1">
-                <a:lumMod val="75000"/>
-                <a:lumOff val="25000"/>
-              </a:schemeClr>
-            </a:solidFill>
-          </a:ln>
-        </p:spPr>
-        <p:style>
-          <a:lnRef idx="1">
-            <a:schemeClr val="accent1"/>
-          </a:lnRef>
-          <a:fillRef idx="0">
-            <a:schemeClr val="accent1"/>
-          </a:fillRef>
-          <a:effectRef idx="0">
-            <a:schemeClr val="accent1"/>
-          </a:effectRef>
-          <a:fontRef idx="minor">
-            <a:schemeClr val="tx1"/>
-          </a:fontRef>
-        </p:style>
-      </p:cxnSp>
-      <p:cxnSp>
-        <p:nvCxnSpPr>
-          <p:cNvPr id="36" name="直線コネクタ 35"/>
-          <p:cNvCxnSpPr/>
-          <p:nvPr/>
-        </p:nvCxnSpPr>
-        <p:spPr>
-          <a:xfrm>
-            <a:off x="2586964" y="3098848"/>
-            <a:ext cx="0" cy="240491"/>
           </a:xfrm>
           <a:prstGeom prst="line">
             <a:avLst/>
@@ -4832,173 +4680,6 @@
           </a:fontRef>
         </p:style>
       </p:cxnSp>
-      <p:sp>
-        <p:nvSpPr>
-          <p:cNvPr id="40" name="テキスト ボックス 39"/>
-          <p:cNvSpPr txBox="1"/>
-          <p:nvPr/>
-        </p:nvSpPr>
-        <p:spPr>
-          <a:xfrm>
-            <a:off x="2038759" y="3917851"/>
-            <a:ext cx="2982351" cy="369332"/>
-          </a:xfrm>
-          <a:prstGeom prst="rect">
-            <a:avLst/>
-          </a:prstGeom>
-          <a:noFill/>
-        </p:spPr>
-        <p:txBody>
-          <a:bodyPr wrap="square" rtlCol="0">
-            <a:spAutoFit/>
-          </a:bodyPr>
-          <a:lstStyle/>
-          <a:p>
-            <a:r>
-              <a:rPr kumimoji="1" lang="en-US" altLang="ja-JP" dirty="0" smtClean="0"/>
-              <a:t>(</a:t>
-            </a:r>
-            <a:r>
-              <a:rPr lang="en-US" altLang="ja-JP" dirty="0"/>
-              <a:t>w</a:t>
-            </a:r>
-            <a:r>
-              <a:rPr kumimoji="1" lang="en-US" altLang="ja-JP" dirty="0" smtClean="0"/>
-              <a:t>)</a:t>
-            </a:r>
-            <a:endParaRPr kumimoji="1" lang="ja-JP" altLang="en-US" dirty="0"/>
-          </a:p>
-        </p:txBody>
-      </p:sp>
-      <p:grpSp>
-        <p:nvGrpSpPr>
-          <p:cNvPr id="2" name="グループ化 1"/>
-          <p:cNvGrpSpPr/>
-          <p:nvPr/>
-        </p:nvGrpSpPr>
-        <p:grpSpPr>
-          <a:xfrm>
-            <a:off x="1819794" y="1604243"/>
-            <a:ext cx="240492" cy="1685891"/>
-            <a:chOff x="5363834" y="2583654"/>
-            <a:chExt cx="240492" cy="1685891"/>
-          </a:xfrm>
-        </p:grpSpPr>
-        <p:cxnSp>
-          <p:nvCxnSpPr>
-            <p:cNvPr id="41" name="直線コネクタ 40"/>
-            <p:cNvCxnSpPr/>
-            <p:nvPr/>
-          </p:nvCxnSpPr>
-          <p:spPr>
-            <a:xfrm>
-              <a:off x="5484082" y="2583654"/>
-              <a:ext cx="0" cy="1685891"/>
-            </a:xfrm>
-            <a:prstGeom prst="line">
-              <a:avLst/>
-            </a:prstGeom>
-            <a:ln w="19050">
-              <a:solidFill>
-                <a:schemeClr val="tx1">
-                  <a:lumMod val="75000"/>
-                  <a:lumOff val="25000"/>
-                </a:schemeClr>
-              </a:solidFill>
-            </a:ln>
-          </p:spPr>
-          <p:style>
-            <a:lnRef idx="1">
-              <a:schemeClr val="accent1"/>
-            </a:lnRef>
-            <a:fillRef idx="0">
-              <a:schemeClr val="accent1"/>
-            </a:fillRef>
-            <a:effectRef idx="0">
-              <a:schemeClr val="accent1"/>
-            </a:effectRef>
-            <a:fontRef idx="minor">
-              <a:schemeClr val="tx1"/>
-            </a:fontRef>
-          </p:style>
-        </p:cxnSp>
-        <p:cxnSp>
-          <p:nvCxnSpPr>
-            <p:cNvPr id="43" name="直線コネクタ 42"/>
-            <p:cNvCxnSpPr/>
-            <p:nvPr/>
-          </p:nvCxnSpPr>
-          <p:spPr>
-            <a:xfrm rot="5400000">
-              <a:off x="5484081" y="2468210"/>
-              <a:ext cx="0" cy="240491"/>
-            </a:xfrm>
-            <a:prstGeom prst="line">
-              <a:avLst/>
-            </a:prstGeom>
-            <a:ln w="19050">
-              <a:solidFill>
-                <a:schemeClr val="tx1">
-                  <a:lumMod val="75000"/>
-                  <a:lumOff val="25000"/>
-                </a:schemeClr>
-              </a:solidFill>
-            </a:ln>
-          </p:spPr>
-          <p:style>
-            <a:lnRef idx="1">
-              <a:schemeClr val="accent1"/>
-            </a:lnRef>
-            <a:fillRef idx="0">
-              <a:schemeClr val="accent1"/>
-            </a:fillRef>
-            <a:effectRef idx="0">
-              <a:schemeClr val="accent1"/>
-            </a:effectRef>
-            <a:fontRef idx="minor">
-              <a:schemeClr val="tx1"/>
-            </a:fontRef>
-          </p:style>
-        </p:cxnSp>
-        <p:cxnSp>
-          <p:nvCxnSpPr>
-            <p:cNvPr id="44" name="直線コネクタ 43"/>
-            <p:cNvCxnSpPr/>
-            <p:nvPr/>
-          </p:nvCxnSpPr>
-          <p:spPr>
-            <a:xfrm rot="5400000">
-              <a:off x="5484080" y="4137462"/>
-              <a:ext cx="0" cy="240491"/>
-            </a:xfrm>
-            <a:prstGeom prst="line">
-              <a:avLst/>
-            </a:prstGeom>
-            <a:ln w="19050">
-              <a:solidFill>
-                <a:schemeClr val="tx1">
-                  <a:lumMod val="75000"/>
-                  <a:lumOff val="25000"/>
-                </a:schemeClr>
-              </a:solidFill>
-            </a:ln>
-          </p:spPr>
-          <p:style>
-            <a:lnRef idx="1">
-              <a:schemeClr val="accent1"/>
-            </a:lnRef>
-            <a:fillRef idx="0">
-              <a:schemeClr val="accent1"/>
-            </a:fillRef>
-            <a:effectRef idx="0">
-              <a:schemeClr val="accent1"/>
-            </a:effectRef>
-            <a:fontRef idx="minor">
-              <a:schemeClr val="tx1"/>
-            </a:fontRef>
-          </p:style>
-        </p:cxnSp>
-      </p:grpSp>
       <p:sp>
         <p:nvSpPr>
           <p:cNvPr id="45" name="テキスト ボックス 44"/>

</xml_diff>